<commit_message>
First part of lecture 21 complete.
</commit_message>
<xml_diff>
--- a/DigitalSystems/Lecture12/pictures/pictures-converted.pptx
+++ b/DigitalSystems/Lecture12/pictures/pictures-converted.pptx
@@ -5,7 +5,7 @@
     <p:sldMasterId id="2147483648" r:id="rId1"/>
   </p:sldMasterIdLst>
   <p:notesMasterIdLst>
-    <p:notesMasterId r:id="rId22"/>
+    <p:notesMasterId r:id="rId23"/>
   </p:notesMasterIdLst>
   <p:sldIdLst>
     <p:sldId id="256" r:id="rId2"/>
@@ -28,6 +28,7 @@
     <p:sldId id="273" r:id="rId19"/>
     <p:sldId id="274" r:id="rId20"/>
     <p:sldId id="275" r:id="rId21"/>
+    <p:sldId id="276" r:id="rId22"/>
   </p:sldIdLst>
   <p:sldSz cx="9144000" cy="6858000" type="screen4x3"/>
   <p:notesSz cx="6858000" cy="9144000"/>
@@ -212,7 +213,7 @@
             <a:fld id="{57664937-CC7E-1147-954A-F42817EF7E06}" type="datetimeFigureOut">
               <a:rPr lang="en-US" smtClean="0"/>
               <a:pPr/>
-              <a:t>2/4/10</a:t>
+              <a:t>2/6/10</a:t>
             </a:fld>
             <a:endParaRPr lang="en-US"/>
           </a:p>
@@ -742,7 +743,7 @@
             <a:fld id="{5D51CFD4-D50C-3141-B28B-5C3A3C05403C}" type="datetimeFigureOut">
               <a:rPr lang="en-US" smtClean="0"/>
               <a:pPr/>
-              <a:t>2/4/10</a:t>
+              <a:t>2/6/10</a:t>
             </a:fld>
             <a:endParaRPr lang="en-US"/>
           </a:p>
@@ -909,7 +910,7 @@
             <a:fld id="{5D51CFD4-D50C-3141-B28B-5C3A3C05403C}" type="datetimeFigureOut">
               <a:rPr lang="en-US" smtClean="0"/>
               <a:pPr/>
-              <a:t>2/4/10</a:t>
+              <a:t>2/6/10</a:t>
             </a:fld>
             <a:endParaRPr lang="en-US"/>
           </a:p>
@@ -1086,7 +1087,7 @@
             <a:fld id="{5D51CFD4-D50C-3141-B28B-5C3A3C05403C}" type="datetimeFigureOut">
               <a:rPr lang="en-US" smtClean="0"/>
               <a:pPr/>
-              <a:t>2/4/10</a:t>
+              <a:t>2/6/10</a:t>
             </a:fld>
             <a:endParaRPr lang="en-US"/>
           </a:p>
@@ -1253,7 +1254,7 @@
             <a:fld id="{5D51CFD4-D50C-3141-B28B-5C3A3C05403C}" type="datetimeFigureOut">
               <a:rPr lang="en-US" smtClean="0"/>
               <a:pPr/>
-              <a:t>2/4/10</a:t>
+              <a:t>2/6/10</a:t>
             </a:fld>
             <a:endParaRPr lang="en-US"/>
           </a:p>
@@ -1496,7 +1497,7 @@
             <a:fld id="{5D51CFD4-D50C-3141-B28B-5C3A3C05403C}" type="datetimeFigureOut">
               <a:rPr lang="en-US" smtClean="0"/>
               <a:pPr/>
-              <a:t>2/4/10</a:t>
+              <a:t>2/6/10</a:t>
             </a:fld>
             <a:endParaRPr lang="en-US"/>
           </a:p>
@@ -1781,7 +1782,7 @@
             <a:fld id="{5D51CFD4-D50C-3141-B28B-5C3A3C05403C}" type="datetimeFigureOut">
               <a:rPr lang="en-US" smtClean="0"/>
               <a:pPr/>
-              <a:t>2/4/10</a:t>
+              <a:t>2/6/10</a:t>
             </a:fld>
             <a:endParaRPr lang="en-US"/>
           </a:p>
@@ -2200,7 +2201,7 @@
             <a:fld id="{5D51CFD4-D50C-3141-B28B-5C3A3C05403C}" type="datetimeFigureOut">
               <a:rPr lang="en-US" smtClean="0"/>
               <a:pPr/>
-              <a:t>2/4/10</a:t>
+              <a:t>2/6/10</a:t>
             </a:fld>
             <a:endParaRPr lang="en-US"/>
           </a:p>
@@ -2315,7 +2316,7 @@
             <a:fld id="{5D51CFD4-D50C-3141-B28B-5C3A3C05403C}" type="datetimeFigureOut">
               <a:rPr lang="en-US" smtClean="0"/>
               <a:pPr/>
-              <a:t>2/4/10</a:t>
+              <a:t>2/6/10</a:t>
             </a:fld>
             <a:endParaRPr lang="en-US"/>
           </a:p>
@@ -2407,7 +2408,7 @@
             <a:fld id="{5D51CFD4-D50C-3141-B28B-5C3A3C05403C}" type="datetimeFigureOut">
               <a:rPr lang="en-US" smtClean="0"/>
               <a:pPr/>
-              <a:t>2/4/10</a:t>
+              <a:t>2/6/10</a:t>
             </a:fld>
             <a:endParaRPr lang="en-US"/>
           </a:p>
@@ -2681,7 +2682,7 @@
             <a:fld id="{5D51CFD4-D50C-3141-B28B-5C3A3C05403C}" type="datetimeFigureOut">
               <a:rPr lang="en-US" smtClean="0"/>
               <a:pPr/>
-              <a:t>2/4/10</a:t>
+              <a:t>2/6/10</a:t>
             </a:fld>
             <a:endParaRPr lang="en-US"/>
           </a:p>
@@ -2931,7 +2932,7 @@
             <a:fld id="{5D51CFD4-D50C-3141-B28B-5C3A3C05403C}" type="datetimeFigureOut">
               <a:rPr lang="en-US" smtClean="0"/>
               <a:pPr/>
-              <a:t>2/4/10</a:t>
+              <a:t>2/6/10</a:t>
             </a:fld>
             <a:endParaRPr lang="en-US"/>
           </a:p>
@@ -3141,7 +3142,7 @@
             <a:fld id="{5D51CFD4-D50C-3141-B28B-5C3A3C05403C}" type="datetimeFigureOut">
               <a:rPr lang="en-US" smtClean="0"/>
               <a:pPr/>
-              <a:t>2/4/10</a:t>
+              <a:t>2/6/10</a:t>
             </a:fld>
             <a:endParaRPr lang="en-US"/>
           </a:p>
@@ -3569,7 +3570,7 @@
               </a:stretch>
             </p:blipFill>
           </mc:Choice>
-          <mc:Fallback xmlns:p="http://schemas.openxmlformats.org/presentationml/2006/main" xmlns:mv="urn:schemas-microsoft-com:mac:vml" xmlns:mc="http://schemas.openxmlformats.org/markup-compatibility/2006" xmlns:r="http://schemas.openxmlformats.org/officeDocument/2006/relationships" xmlns:a="http://schemas.openxmlformats.org/drawingml/2006/main" xmlns="" xmlns:ma="http://schemas.microsoft.com/office/mac/drawingml/2008/main">
+          <mc:Fallback xmlns:ma="http://schemas.microsoft.com/office/mac/drawingml/2008/main" xmlns="" xmlns:a="http://schemas.openxmlformats.org/drawingml/2006/main" xmlns:r="http://schemas.openxmlformats.org/officeDocument/2006/relationships" xmlns:mc="http://schemas.openxmlformats.org/markup-compatibility/2006" xmlns:mv="urn:schemas-microsoft-com:mac:vml" xmlns:p="http://schemas.openxmlformats.org/presentationml/2006/main">
             <p:blipFill>
               <a:blip r:embed="rId3"/>
               <a:stretch>
@@ -3673,7 +3674,7 @@
               </a:stretch>
             </p:blipFill>
           </mc:Choice>
-          <mc:Fallback xmlns:p="http://schemas.openxmlformats.org/presentationml/2006/main" xmlns:mv="urn:schemas-microsoft-com:mac:vml" xmlns:mc="http://schemas.openxmlformats.org/markup-compatibility/2006" xmlns:r="http://schemas.openxmlformats.org/officeDocument/2006/relationships" xmlns:a="http://schemas.openxmlformats.org/drawingml/2006/main" xmlns="" xmlns:ma="http://schemas.microsoft.com/office/mac/drawingml/2008/main">
+          <mc:Fallback xmlns:ma="http://schemas.microsoft.com/office/mac/drawingml/2008/main" xmlns="" xmlns:a="http://schemas.openxmlformats.org/drawingml/2006/main" xmlns:r="http://schemas.openxmlformats.org/officeDocument/2006/relationships" xmlns:mc="http://schemas.openxmlformats.org/markup-compatibility/2006" xmlns:mv="urn:schemas-microsoft-com:mac:vml" xmlns:p="http://schemas.openxmlformats.org/presentationml/2006/main">
             <p:blipFill>
               <a:blip r:embed="rId5"/>
               <a:stretch>
@@ -3743,7 +3744,7 @@
               </a:stretch>
             </p:blipFill>
           </mc:Choice>
-          <mc:Fallback xmlns:p="http://schemas.openxmlformats.org/presentationml/2006/main" xmlns:mv="urn:schemas-microsoft-com:mac:vml" xmlns:mc="http://schemas.openxmlformats.org/markup-compatibility/2006" xmlns:r="http://schemas.openxmlformats.org/officeDocument/2006/relationships" xmlns:a="http://schemas.openxmlformats.org/drawingml/2006/main" xmlns="" xmlns:ma="http://schemas.microsoft.com/office/mac/drawingml/2008/main">
+          <mc:Fallback xmlns:ma="http://schemas.microsoft.com/office/mac/drawingml/2008/main" xmlns="" xmlns:a="http://schemas.openxmlformats.org/drawingml/2006/main" xmlns:r="http://schemas.openxmlformats.org/officeDocument/2006/relationships" xmlns:mc="http://schemas.openxmlformats.org/markup-compatibility/2006" xmlns:mv="urn:schemas-microsoft-com:mac:vml" xmlns:p="http://schemas.openxmlformats.org/presentationml/2006/main">
             <p:blipFill>
               <a:blip r:embed="rId7"/>
               <a:stretch>
@@ -3847,7 +3848,7 @@
               </a:stretch>
             </p:blipFill>
           </mc:Choice>
-          <mc:Fallback xmlns:p="http://schemas.openxmlformats.org/presentationml/2006/main" xmlns:mv="urn:schemas-microsoft-com:mac:vml" xmlns:mc="http://schemas.openxmlformats.org/markup-compatibility/2006" xmlns:r="http://schemas.openxmlformats.org/officeDocument/2006/relationships" xmlns:a="http://schemas.openxmlformats.org/drawingml/2006/main" xmlns="" xmlns:ma="http://schemas.microsoft.com/office/mac/drawingml/2008/main">
+          <mc:Fallback xmlns:ma="http://schemas.microsoft.com/office/mac/drawingml/2008/main" xmlns="" xmlns:a="http://schemas.openxmlformats.org/drawingml/2006/main" xmlns:r="http://schemas.openxmlformats.org/officeDocument/2006/relationships" xmlns:mc="http://schemas.openxmlformats.org/markup-compatibility/2006" xmlns:mv="urn:schemas-microsoft-com:mac:vml" xmlns:p="http://schemas.openxmlformats.org/presentationml/2006/main">
             <p:blipFill>
               <a:blip r:embed="rId9"/>
               <a:stretch>
@@ -3985,7 +3986,7 @@
               </a:stretch>
             </p:blipFill>
           </mc:Choice>
-          <mc:Fallback xmlns:p="http://schemas.openxmlformats.org/presentationml/2006/main" xmlns:mv="urn:schemas-microsoft-com:mac:vml" xmlns:mc="http://schemas.openxmlformats.org/markup-compatibility/2006" xmlns:r="http://schemas.openxmlformats.org/officeDocument/2006/relationships" xmlns:a="http://schemas.openxmlformats.org/drawingml/2006/main" xmlns="" xmlns:ma="http://schemas.microsoft.com/office/mac/drawingml/2008/main">
+          <mc:Fallback xmlns:ma="http://schemas.microsoft.com/office/mac/drawingml/2008/main" xmlns="" xmlns:a="http://schemas.openxmlformats.org/drawingml/2006/main" xmlns:r="http://schemas.openxmlformats.org/officeDocument/2006/relationships" xmlns:mc="http://schemas.openxmlformats.org/markup-compatibility/2006" xmlns:mv="urn:schemas-microsoft-com:mac:vml" xmlns:p="http://schemas.openxmlformats.org/presentationml/2006/main">
             <p:blipFill>
               <a:blip r:embed="rId11"/>
               <a:stretch>
@@ -4231,7 +4232,7 @@
               </a:stretch>
             </p:blipFill>
           </mc:Choice>
-          <mc:Fallback xmlns:p="http://schemas.openxmlformats.org/presentationml/2006/main" xmlns:mv="urn:schemas-microsoft-com:mac:vml" xmlns:mc="http://schemas.openxmlformats.org/markup-compatibility/2006" xmlns:r="http://schemas.openxmlformats.org/officeDocument/2006/relationships" xmlns:a="http://schemas.openxmlformats.org/drawingml/2006/main" xmlns="" xmlns:ma="http://schemas.microsoft.com/office/mac/drawingml/2008/main">
+          <mc:Fallback xmlns:ma="http://schemas.microsoft.com/office/mac/drawingml/2008/main" xmlns="" xmlns:a="http://schemas.openxmlformats.org/drawingml/2006/main" xmlns:r="http://schemas.openxmlformats.org/officeDocument/2006/relationships" xmlns:mc="http://schemas.openxmlformats.org/markup-compatibility/2006" xmlns:mv="urn:schemas-microsoft-com:mac:vml" xmlns:p="http://schemas.openxmlformats.org/presentationml/2006/main">
             <p:blipFill>
               <a:blip r:embed="rId13"/>
               <a:stretch>
@@ -13041,6 +13042,1436 @@
                 <a:latin typeface="Symbol"/>
               </a:rPr>
               <a:t>+</a:t>
+            </a:r>
+            <a:endParaRPr lang="en-US" sz="1200" dirty="0">
+              <a:latin typeface="Symbol"/>
+            </a:endParaRPr>
+          </a:p>
+        </p:txBody>
+      </p:sp>
+    </p:spTree>
+  </p:cSld>
+  <p:clrMapOvr>
+    <a:masterClrMapping/>
+  </p:clrMapOvr>
+</p:sld>
+</file>
+
+<file path=ppt/slides/slide21.xml><?xml version="1.0" encoding="utf-8"?>
+<p:sld xmlns:a="http://schemas.openxmlformats.org/drawingml/2006/main" xmlns:r="http://schemas.openxmlformats.org/officeDocument/2006/relationships" xmlns:mc="http://schemas.openxmlformats.org/markup-compatibility/2006" xmlns:mv="urn:schemas-microsoft-com:mac:vml" xmlns:p="http://schemas.openxmlformats.org/presentationml/2006/main" mc:Ignorable="mv" mc:PreserveAttributes="mv:*">
+  <p:cSld>
+    <p:spTree>
+      <p:nvGrpSpPr>
+        <p:cNvPr id="1" name=""/>
+        <p:cNvGrpSpPr/>
+        <p:nvPr/>
+      </p:nvGrpSpPr>
+      <p:grpSpPr>
+        <a:xfrm>
+          <a:off x="0" y="0"/>
+          <a:ext cx="0" cy="0"/>
+          <a:chOff x="0" y="0"/>
+          <a:chExt cx="0" cy="0"/>
+        </a:xfrm>
+      </p:grpSpPr>
+      <p:cxnSp>
+        <p:nvCxnSpPr>
+          <p:cNvPr id="11" name="Straight Arrow Connector 10"/>
+          <p:cNvCxnSpPr/>
+          <p:nvPr/>
+        </p:nvCxnSpPr>
+        <p:spPr>
+          <a:xfrm>
+            <a:off x="3002857" y="4659493"/>
+            <a:ext cx="537173" cy="1"/>
+          </a:xfrm>
+          <a:prstGeom prst="straightConnector1">
+            <a:avLst/>
+          </a:prstGeom>
+          <a:ln w="12700">
+            <a:solidFill>
+              <a:schemeClr val="tx1"/>
+            </a:solidFill>
+            <a:tailEnd type="triangle"/>
+          </a:ln>
+          <a:effectLst/>
+        </p:spPr>
+        <p:style>
+          <a:lnRef idx="2">
+            <a:schemeClr val="accent1"/>
+          </a:lnRef>
+          <a:fillRef idx="0">
+            <a:schemeClr val="accent1"/>
+          </a:fillRef>
+          <a:effectRef idx="1">
+            <a:schemeClr val="accent1"/>
+          </a:effectRef>
+          <a:fontRef idx="minor">
+            <a:schemeClr val="tx1"/>
+          </a:fontRef>
+        </p:style>
+      </p:cxnSp>
+      <p:sp>
+        <p:nvSpPr>
+          <p:cNvPr id="14" name="TextBox 13"/>
+          <p:cNvSpPr txBox="1"/>
+          <p:nvPr/>
+        </p:nvSpPr>
+        <p:spPr>
+          <a:xfrm>
+            <a:off x="565396" y="4495500"/>
+            <a:ext cx="272831" cy="276999"/>
+          </a:xfrm>
+          <a:prstGeom prst="rect">
+            <a:avLst/>
+          </a:prstGeom>
+          <a:noFill/>
+        </p:spPr>
+        <p:txBody>
+          <a:bodyPr wrap="none" rtlCol="0">
+            <a:spAutoFit/>
+          </a:bodyPr>
+          <a:lstStyle/>
+          <a:p>
+            <a:r>
+              <a:rPr lang="en-US" sz="1200" i="1" dirty="0" err="1" smtClean="0">
+                <a:latin typeface="Times New Roman"/>
+              </a:rPr>
+              <a:t>u</a:t>
+            </a:r>
+            <a:endParaRPr lang="en-US" sz="1200" dirty="0">
+              <a:latin typeface="Times New Roman"/>
+            </a:endParaRPr>
+          </a:p>
+        </p:txBody>
+      </p:sp>
+      <p:sp>
+        <p:nvSpPr>
+          <p:cNvPr id="15" name="TextBox 14"/>
+          <p:cNvSpPr txBox="1"/>
+          <p:nvPr/>
+        </p:nvSpPr>
+        <p:spPr>
+          <a:xfrm>
+            <a:off x="3482301" y="4488005"/>
+            <a:ext cx="278617" cy="276999"/>
+          </a:xfrm>
+          <a:prstGeom prst="rect">
+            <a:avLst/>
+          </a:prstGeom>
+          <a:noFill/>
+        </p:spPr>
+        <p:txBody>
+          <a:bodyPr wrap="none" rtlCol="0">
+            <a:spAutoFit/>
+          </a:bodyPr>
+          <a:lstStyle/>
+          <a:p>
+            <a:r>
+              <a:rPr lang="en-US" sz="1200" i="1" dirty="0" err="1" smtClean="0">
+                <a:latin typeface="Times New Roman"/>
+              </a:rPr>
+              <a:t>y</a:t>
+            </a:r>
+            <a:endParaRPr lang="en-US" sz="1200" dirty="0">
+              <a:latin typeface="Times New Roman"/>
+            </a:endParaRPr>
+          </a:p>
+        </p:txBody>
+      </p:sp>
+      <p:cxnSp>
+        <p:nvCxnSpPr>
+          <p:cNvPr id="22" name="Straight Arrow Connector 21"/>
+          <p:cNvCxnSpPr/>
+          <p:nvPr/>
+        </p:nvCxnSpPr>
+        <p:spPr>
+          <a:xfrm>
+            <a:off x="761021" y="4667978"/>
+            <a:ext cx="1022446" cy="1588"/>
+          </a:xfrm>
+          <a:prstGeom prst="straightConnector1">
+            <a:avLst/>
+          </a:prstGeom>
+          <a:ln w="12700">
+            <a:solidFill>
+              <a:schemeClr val="tx1"/>
+            </a:solidFill>
+            <a:tailEnd type="triangle"/>
+          </a:ln>
+          <a:effectLst/>
+        </p:spPr>
+        <p:style>
+          <a:lnRef idx="2">
+            <a:schemeClr val="accent1"/>
+          </a:lnRef>
+          <a:fillRef idx="0">
+            <a:schemeClr val="accent1"/>
+          </a:fillRef>
+          <a:effectRef idx="1">
+            <a:schemeClr val="accent1"/>
+          </a:effectRef>
+          <a:fontRef idx="minor">
+            <a:schemeClr val="tx1"/>
+          </a:fontRef>
+        </p:style>
+      </p:cxnSp>
+      <p:cxnSp>
+        <p:nvCxnSpPr>
+          <p:cNvPr id="23" name="Shape 22"/>
+          <p:cNvCxnSpPr>
+            <a:endCxn id="29" idx="1"/>
+          </p:cNvCxnSpPr>
+          <p:nvPr/>
+        </p:nvCxnSpPr>
+        <p:spPr>
+          <a:xfrm rot="16200000" flipH="1">
+            <a:off x="927750" y="5040040"/>
+            <a:ext cx="1225927" cy="464838"/>
+          </a:xfrm>
+          <a:prstGeom prst="bentConnector2">
+            <a:avLst/>
+          </a:prstGeom>
+          <a:ln w="12700">
+            <a:solidFill>
+              <a:schemeClr val="tx1"/>
+            </a:solidFill>
+            <a:tailEnd type="triangle"/>
+          </a:ln>
+          <a:effectLst/>
+        </p:spPr>
+        <p:style>
+          <a:lnRef idx="2">
+            <a:schemeClr val="accent1"/>
+          </a:lnRef>
+          <a:fillRef idx="0">
+            <a:schemeClr val="accent1"/>
+          </a:fillRef>
+          <a:effectRef idx="1">
+            <a:schemeClr val="accent1"/>
+          </a:effectRef>
+          <a:fontRef idx="minor">
+            <a:schemeClr val="tx1"/>
+          </a:fontRef>
+        </p:style>
+      </p:cxnSp>
+      <p:grpSp>
+        <p:nvGrpSpPr>
+          <p:cNvPr id="27" name="Group 26"/>
+          <p:cNvGrpSpPr/>
+          <p:nvPr/>
+        </p:nvGrpSpPr>
+        <p:grpSpPr>
+          <a:xfrm>
+            <a:off x="1773132" y="4226748"/>
+            <a:ext cx="1229725" cy="919071"/>
+            <a:chOff x="1773132" y="4226748"/>
+            <a:chExt cx="1229725" cy="919071"/>
+          </a:xfrm>
+        </p:grpSpPr>
+        <p:sp>
+          <p:nvSpPr>
+            <p:cNvPr id="20" name="Rectangle 19"/>
+            <p:cNvSpPr/>
+            <p:nvPr/>
+          </p:nvSpPr>
+          <p:spPr>
+            <a:xfrm>
+              <a:off x="1773132" y="4226748"/>
+              <a:ext cx="1229725" cy="919071"/>
+            </a:xfrm>
+            <a:prstGeom prst="rect">
+              <a:avLst/>
+            </a:prstGeom>
+            <a:noFill/>
+            <a:ln>
+              <a:solidFill>
+                <a:schemeClr val="tx1"/>
+              </a:solidFill>
+            </a:ln>
+            <a:effectLst/>
+          </p:spPr>
+          <p:style>
+            <a:lnRef idx="1">
+              <a:schemeClr val="accent1"/>
+            </a:lnRef>
+            <a:fillRef idx="3">
+              <a:schemeClr val="accent1"/>
+            </a:fillRef>
+            <a:effectRef idx="2">
+              <a:schemeClr val="accent1"/>
+            </a:effectRef>
+            <a:fontRef idx="minor">
+              <a:schemeClr val="lt1"/>
+            </a:fontRef>
+          </p:style>
+          <p:txBody>
+            <a:bodyPr rtlCol="0" anchor="ctr"/>
+            <a:lstStyle/>
+            <a:p>
+              <a:pPr algn="ctr"/>
+              <a:endParaRPr lang="en-US"/>
+            </a:p>
+          </p:txBody>
+        </p:sp>
+        <p:sp>
+          <p:nvSpPr>
+            <p:cNvPr id="26" name="TextBox 25"/>
+            <p:cNvSpPr txBox="1"/>
+            <p:nvPr/>
+          </p:nvSpPr>
+          <p:spPr>
+            <a:xfrm>
+              <a:off x="1910941" y="4455451"/>
+              <a:ext cx="954107" cy="461665"/>
+            </a:xfrm>
+            <a:prstGeom prst="rect">
+              <a:avLst/>
+            </a:prstGeom>
+            <a:noFill/>
+          </p:spPr>
+          <p:txBody>
+            <a:bodyPr wrap="none" rtlCol="0">
+              <a:spAutoFit/>
+            </a:bodyPr>
+            <a:lstStyle/>
+            <a:p>
+              <a:pPr algn="ctr"/>
+              <a:r>
+                <a:rPr lang="en-US" sz="1200" dirty="0" smtClean="0">
+                  <a:latin typeface="Times New Roman"/>
+                </a:rPr>
+                <a:t>System with</a:t>
+              </a:r>
+            </a:p>
+            <a:p>
+              <a:r>
+                <a:rPr lang="en-US" sz="1200" dirty="0" smtClean="0">
+                  <a:latin typeface="Times New Roman"/>
+                </a:rPr>
+                <a:t>state </a:t>
+              </a:r>
+              <a:r>
+                <a:rPr lang="en-US" sz="1200" b="1" dirty="0" err="1" smtClean="0">
+                  <a:latin typeface="Times New Roman"/>
+                </a:rPr>
+                <a:t>x</a:t>
+              </a:r>
+              <a:endParaRPr lang="en-US" sz="1200" b="1" dirty="0">
+                <a:latin typeface="Times New Roman"/>
+              </a:endParaRPr>
+            </a:p>
+          </p:txBody>
+        </p:sp>
+      </p:grpSp>
+      <p:grpSp>
+        <p:nvGrpSpPr>
+          <p:cNvPr id="28" name="Group 27"/>
+          <p:cNvGrpSpPr/>
+          <p:nvPr/>
+        </p:nvGrpSpPr>
+        <p:grpSpPr>
+          <a:xfrm>
+            <a:off x="1773132" y="5425887"/>
+            <a:ext cx="1229725" cy="919071"/>
+            <a:chOff x="1773132" y="4226748"/>
+            <a:chExt cx="1229725" cy="919071"/>
+          </a:xfrm>
+        </p:grpSpPr>
+        <p:sp>
+          <p:nvSpPr>
+            <p:cNvPr id="29" name="Rectangle 28"/>
+            <p:cNvSpPr/>
+            <p:nvPr/>
+          </p:nvSpPr>
+          <p:spPr>
+            <a:xfrm>
+              <a:off x="1773132" y="4226748"/>
+              <a:ext cx="1229725" cy="919071"/>
+            </a:xfrm>
+            <a:prstGeom prst="rect">
+              <a:avLst/>
+            </a:prstGeom>
+            <a:noFill/>
+            <a:ln>
+              <a:solidFill>
+                <a:schemeClr val="tx1"/>
+              </a:solidFill>
+            </a:ln>
+            <a:effectLst/>
+          </p:spPr>
+          <p:style>
+            <a:lnRef idx="1">
+              <a:schemeClr val="accent1"/>
+            </a:lnRef>
+            <a:fillRef idx="3">
+              <a:schemeClr val="accent1"/>
+            </a:fillRef>
+            <a:effectRef idx="2">
+              <a:schemeClr val="accent1"/>
+            </a:effectRef>
+            <a:fontRef idx="minor">
+              <a:schemeClr val="lt1"/>
+            </a:fontRef>
+          </p:style>
+          <p:txBody>
+            <a:bodyPr rtlCol="0" anchor="ctr"/>
+            <a:lstStyle/>
+            <a:p>
+              <a:pPr algn="ctr"/>
+              <a:endParaRPr lang="en-US"/>
+            </a:p>
+          </p:txBody>
+        </p:sp>
+        <p:sp>
+          <p:nvSpPr>
+            <p:cNvPr id="30" name="TextBox 29"/>
+            <p:cNvSpPr txBox="1"/>
+            <p:nvPr/>
+          </p:nvSpPr>
+          <p:spPr>
+            <a:xfrm>
+              <a:off x="1857629" y="4455451"/>
+              <a:ext cx="1060732" cy="461665"/>
+            </a:xfrm>
+            <a:prstGeom prst="rect">
+              <a:avLst/>
+            </a:prstGeom>
+            <a:noFill/>
+          </p:spPr>
+          <p:txBody>
+            <a:bodyPr wrap="none" rtlCol="0">
+              <a:spAutoFit/>
+            </a:bodyPr>
+            <a:lstStyle/>
+            <a:p>
+              <a:pPr algn="ctr"/>
+              <a:r>
+                <a:rPr lang="en-US" sz="1200" dirty="0" smtClean="0">
+                  <a:latin typeface="Times New Roman"/>
+                </a:rPr>
+                <a:t>Observer with</a:t>
+              </a:r>
+            </a:p>
+            <a:p>
+              <a:r>
+                <a:rPr lang="en-US" sz="1200" dirty="0" smtClean="0">
+                  <a:latin typeface="Times New Roman"/>
+                </a:rPr>
+                <a:t>state</a:t>
+              </a:r>
+              <a:endParaRPr lang="en-US" sz="1200" b="1" dirty="0">
+                <a:latin typeface="Times New Roman"/>
+              </a:endParaRPr>
+            </a:p>
+          </p:txBody>
+        </p:sp>
+      </p:grpSp>
+      <p:sp>
+        <p:nvSpPr>
+          <p:cNvPr id="33" name="Right Arrow 32"/>
+          <p:cNvSpPr/>
+          <p:nvPr/>
+        </p:nvSpPr>
+        <p:spPr>
+          <a:xfrm>
+            <a:off x="3004845" y="5731026"/>
+            <a:ext cx="535185" cy="228703"/>
+          </a:xfrm>
+          <a:prstGeom prst="rightArrow">
+            <a:avLst/>
+          </a:prstGeom>
+          <a:noFill/>
+          <a:ln>
+            <a:solidFill>
+              <a:schemeClr val="tx1"/>
+            </a:solidFill>
+          </a:ln>
+          <a:effectLst/>
+        </p:spPr>
+        <p:style>
+          <a:lnRef idx="1">
+            <a:schemeClr val="accent1"/>
+          </a:lnRef>
+          <a:fillRef idx="3">
+            <a:schemeClr val="accent1"/>
+          </a:fillRef>
+          <a:effectRef idx="2">
+            <a:schemeClr val="accent1"/>
+          </a:effectRef>
+          <a:fontRef idx="minor">
+            <a:schemeClr val="lt1"/>
+          </a:fontRef>
+        </p:style>
+      </p:sp>
+      <p:graphicFrame>
+        <p:nvGraphicFramePr>
+          <p:cNvPr id="35" name="Object 34"/>
+          <p:cNvGraphicFramePr>
+            <a:graphicFrameLocks noChangeAspect="1"/>
+          </p:cNvGraphicFramePr>
+          <p:nvPr/>
+        </p:nvGraphicFramePr>
+        <p:xfrm>
+          <a:off x="3558109" y="5731026"/>
+          <a:ext cx="127000" cy="165100"/>
+        </p:xfrm>
+        <a:graphic>
+          <a:graphicData uri="http://schemas.openxmlformats.org/presentationml/2006/ole">
+            <p:oleObj spid="_x0000_s62468" name="Equation" r:id="rId3" imgW="127000" imgH="165100" progId="Equation.DSMT4">
+              <p:embed/>
+            </p:oleObj>
+          </a:graphicData>
+        </a:graphic>
+      </p:graphicFrame>
+      <p:graphicFrame>
+        <p:nvGraphicFramePr>
+          <p:cNvPr id="36" name="Object 35"/>
+          <p:cNvGraphicFramePr>
+            <a:graphicFrameLocks noChangeAspect="1"/>
+          </p:cNvGraphicFramePr>
+          <p:nvPr/>
+        </p:nvGraphicFramePr>
+        <p:xfrm>
+          <a:off x="2572177" y="5896126"/>
+          <a:ext cx="127000" cy="165100"/>
+        </p:xfrm>
+        <a:graphic>
+          <a:graphicData uri="http://schemas.openxmlformats.org/presentationml/2006/ole">
+            <p:oleObj spid="_x0000_s62471" name="Equation" r:id="rId4" imgW="127000" imgH="165100" progId="Equation.DSMT4">
+              <p:embed/>
+            </p:oleObj>
+          </a:graphicData>
+        </a:graphic>
+      </p:graphicFrame>
+      <p:sp>
+        <p:nvSpPr>
+          <p:cNvPr id="73" name="Bent-Up Arrow 72"/>
+          <p:cNvSpPr/>
+          <p:nvPr/>
+        </p:nvSpPr>
+        <p:spPr>
+          <a:xfrm rot="10800000">
+            <a:off x="2321296" y="1845630"/>
+            <a:ext cx="1215488" cy="524256"/>
+          </a:xfrm>
+          <a:prstGeom prst="bentUpArrow">
+            <a:avLst/>
+          </a:prstGeom>
+          <a:solidFill>
+            <a:schemeClr val="bg1"/>
+          </a:solidFill>
+          <a:ln>
+            <a:solidFill>
+              <a:schemeClr val="tx1"/>
+            </a:solidFill>
+          </a:ln>
+          <a:effectLst/>
+        </p:spPr>
+        <p:style>
+          <a:lnRef idx="1">
+            <a:schemeClr val="accent1"/>
+          </a:lnRef>
+          <a:fillRef idx="3">
+            <a:schemeClr val="accent1"/>
+          </a:fillRef>
+          <a:effectRef idx="2">
+            <a:schemeClr val="accent1"/>
+          </a:effectRef>
+          <a:fontRef idx="minor">
+            <a:schemeClr val="lt1"/>
+          </a:fontRef>
+        </p:style>
+      </p:sp>
+      <p:sp>
+        <p:nvSpPr>
+          <p:cNvPr id="72" name="Left-Right-Up Arrow 71"/>
+          <p:cNvSpPr/>
+          <p:nvPr/>
+        </p:nvSpPr>
+        <p:spPr>
+          <a:xfrm flipV="1">
+            <a:off x="2672499" y="2681794"/>
+            <a:ext cx="1216152" cy="850392"/>
+          </a:xfrm>
+          <a:prstGeom prst="leftRightUpArrow">
+            <a:avLst>
+              <a:gd name="adj1" fmla="val 9176"/>
+              <a:gd name="adj2" fmla="val 17088"/>
+              <a:gd name="adj3" fmla="val 25000"/>
+            </a:avLst>
+          </a:prstGeom>
+          <a:solidFill>
+            <a:schemeClr val="bg1"/>
+          </a:solidFill>
+          <a:ln>
+            <a:solidFill>
+              <a:schemeClr val="tx1"/>
+            </a:solidFill>
+          </a:ln>
+          <a:effectLst/>
+        </p:spPr>
+        <p:style>
+          <a:lnRef idx="1">
+            <a:schemeClr val="accent1"/>
+          </a:lnRef>
+          <a:fillRef idx="3">
+            <a:schemeClr val="accent1"/>
+          </a:fillRef>
+          <a:effectRef idx="2">
+            <a:schemeClr val="accent1"/>
+          </a:effectRef>
+          <a:fontRef idx="minor">
+            <a:schemeClr val="lt1"/>
+          </a:fontRef>
+        </p:style>
+        <p:txBody>
+          <a:bodyPr rtlCol="0" anchor="ctr"/>
+          <a:lstStyle/>
+          <a:p>
+            <a:pPr algn="ctr"/>
+            <a:endParaRPr lang="en-US"/>
+          </a:p>
+        </p:txBody>
+      </p:sp>
+      <p:cxnSp>
+        <p:nvCxnSpPr>
+          <p:cNvPr id="37" name="Straight Arrow Connector 36"/>
+          <p:cNvCxnSpPr/>
+          <p:nvPr/>
+        </p:nvCxnSpPr>
+        <p:spPr>
+          <a:xfrm>
+            <a:off x="3002857" y="1017955"/>
+            <a:ext cx="2411830" cy="1588"/>
+          </a:xfrm>
+          <a:prstGeom prst="straightConnector1">
+            <a:avLst/>
+          </a:prstGeom>
+          <a:ln w="12700">
+            <a:solidFill>
+              <a:schemeClr val="tx1"/>
+            </a:solidFill>
+            <a:tailEnd type="triangle"/>
+          </a:ln>
+          <a:effectLst/>
+        </p:spPr>
+        <p:style>
+          <a:lnRef idx="2">
+            <a:schemeClr val="accent1"/>
+          </a:lnRef>
+          <a:fillRef idx="0">
+            <a:schemeClr val="accent1"/>
+          </a:fillRef>
+          <a:effectRef idx="1">
+            <a:schemeClr val="accent1"/>
+          </a:effectRef>
+          <a:fontRef idx="minor">
+            <a:schemeClr val="tx1"/>
+          </a:fontRef>
+        </p:style>
+      </p:cxnSp>
+      <p:sp>
+        <p:nvSpPr>
+          <p:cNvPr id="38" name="TextBox 37"/>
+          <p:cNvSpPr txBox="1"/>
+          <p:nvPr/>
+        </p:nvSpPr>
+        <p:spPr>
+          <a:xfrm>
+            <a:off x="565396" y="853962"/>
+            <a:ext cx="272831" cy="276999"/>
+          </a:xfrm>
+          <a:prstGeom prst="rect">
+            <a:avLst/>
+          </a:prstGeom>
+          <a:noFill/>
+        </p:spPr>
+        <p:txBody>
+          <a:bodyPr wrap="none" rtlCol="0">
+            <a:spAutoFit/>
+          </a:bodyPr>
+          <a:lstStyle/>
+          <a:p>
+            <a:r>
+              <a:rPr lang="en-US" sz="1200" i="1" dirty="0" err="1" smtClean="0">
+                <a:latin typeface="Times New Roman"/>
+              </a:rPr>
+              <a:t>u</a:t>
+            </a:r>
+            <a:endParaRPr lang="en-US" sz="1200" dirty="0">
+              <a:latin typeface="Times New Roman"/>
+            </a:endParaRPr>
+          </a:p>
+        </p:txBody>
+      </p:sp>
+      <p:sp>
+        <p:nvSpPr>
+          <p:cNvPr id="39" name="TextBox 38"/>
+          <p:cNvSpPr txBox="1"/>
+          <p:nvPr/>
+        </p:nvSpPr>
+        <p:spPr>
+          <a:xfrm>
+            <a:off x="5372637" y="837400"/>
+            <a:ext cx="278617" cy="276999"/>
+          </a:xfrm>
+          <a:prstGeom prst="rect">
+            <a:avLst/>
+          </a:prstGeom>
+          <a:noFill/>
+        </p:spPr>
+        <p:txBody>
+          <a:bodyPr wrap="none" rtlCol="0">
+            <a:spAutoFit/>
+          </a:bodyPr>
+          <a:lstStyle/>
+          <a:p>
+            <a:r>
+              <a:rPr lang="en-US" sz="1200" i="1" dirty="0" err="1" smtClean="0">
+                <a:latin typeface="Times New Roman"/>
+              </a:rPr>
+              <a:t>y</a:t>
+            </a:r>
+            <a:endParaRPr lang="en-US" sz="1200" dirty="0">
+              <a:latin typeface="Times New Roman"/>
+            </a:endParaRPr>
+          </a:p>
+        </p:txBody>
+      </p:sp>
+      <p:cxnSp>
+        <p:nvCxnSpPr>
+          <p:cNvPr id="40" name="Straight Arrow Connector 39"/>
+          <p:cNvCxnSpPr/>
+          <p:nvPr/>
+        </p:nvCxnSpPr>
+        <p:spPr>
+          <a:xfrm>
+            <a:off x="761021" y="1026440"/>
+            <a:ext cx="1022446" cy="1588"/>
+          </a:xfrm>
+          <a:prstGeom prst="straightConnector1">
+            <a:avLst/>
+          </a:prstGeom>
+          <a:ln w="12700">
+            <a:solidFill>
+              <a:schemeClr val="tx1"/>
+            </a:solidFill>
+            <a:tailEnd type="triangle"/>
+          </a:ln>
+          <a:effectLst/>
+        </p:spPr>
+        <p:style>
+          <a:lnRef idx="2">
+            <a:schemeClr val="accent1"/>
+          </a:lnRef>
+          <a:fillRef idx="0">
+            <a:schemeClr val="accent1"/>
+          </a:fillRef>
+          <a:effectRef idx="1">
+            <a:schemeClr val="accent1"/>
+          </a:effectRef>
+          <a:fontRef idx="minor">
+            <a:schemeClr val="tx1"/>
+          </a:fontRef>
+        </p:style>
+      </p:cxnSp>
+      <p:cxnSp>
+        <p:nvCxnSpPr>
+          <p:cNvPr id="41" name="Shape 40"/>
+          <p:cNvCxnSpPr/>
+          <p:nvPr/>
+        </p:nvCxnSpPr>
+        <p:spPr>
+          <a:xfrm rot="16200000" flipH="1">
+            <a:off x="634981" y="1691270"/>
+            <a:ext cx="1811465" cy="464837"/>
+          </a:xfrm>
+          <a:prstGeom prst="bentConnector2">
+            <a:avLst/>
+          </a:prstGeom>
+          <a:ln w="12700">
+            <a:solidFill>
+              <a:schemeClr val="tx1"/>
+            </a:solidFill>
+            <a:tailEnd type="triangle"/>
+          </a:ln>
+          <a:effectLst/>
+        </p:spPr>
+        <p:style>
+          <a:lnRef idx="2">
+            <a:schemeClr val="accent1"/>
+          </a:lnRef>
+          <a:fillRef idx="0">
+            <a:schemeClr val="accent1"/>
+          </a:fillRef>
+          <a:effectRef idx="1">
+            <a:schemeClr val="accent1"/>
+          </a:effectRef>
+          <a:fontRef idx="minor">
+            <a:schemeClr val="tx1"/>
+          </a:fontRef>
+        </p:style>
+      </p:cxnSp>
+      <p:sp>
+        <p:nvSpPr>
+          <p:cNvPr id="43" name="Rectangle 42"/>
+          <p:cNvSpPr/>
+          <p:nvPr/>
+        </p:nvSpPr>
+        <p:spPr>
+          <a:xfrm>
+            <a:off x="1773132" y="617774"/>
+            <a:ext cx="1229725" cy="919071"/>
+          </a:xfrm>
+          <a:prstGeom prst="rect">
+            <a:avLst/>
+          </a:prstGeom>
+          <a:noFill/>
+          <a:ln>
+            <a:solidFill>
+              <a:schemeClr val="tx1"/>
+            </a:solidFill>
+          </a:ln>
+          <a:effectLst/>
+        </p:spPr>
+        <p:style>
+          <a:lnRef idx="1">
+            <a:schemeClr val="accent1"/>
+          </a:lnRef>
+          <a:fillRef idx="3">
+            <a:schemeClr val="accent1"/>
+          </a:fillRef>
+          <a:effectRef idx="2">
+            <a:schemeClr val="accent1"/>
+          </a:effectRef>
+          <a:fontRef idx="minor">
+            <a:schemeClr val="lt1"/>
+          </a:fontRef>
+        </p:style>
+        <p:txBody>
+          <a:bodyPr rtlCol="0" anchor="ctr"/>
+          <a:lstStyle/>
+          <a:p>
+            <a:pPr algn="ctr"/>
+            <a:endParaRPr lang="en-US"/>
+          </a:p>
+        </p:txBody>
+      </p:sp>
+      <p:sp>
+        <p:nvSpPr>
+          <p:cNvPr id="44" name="TextBox 43"/>
+          <p:cNvSpPr txBox="1"/>
+          <p:nvPr/>
+        </p:nvSpPr>
+        <p:spPr>
+          <a:xfrm>
+            <a:off x="1910941" y="846477"/>
+            <a:ext cx="954107" cy="461665"/>
+          </a:xfrm>
+          <a:prstGeom prst="rect">
+            <a:avLst/>
+          </a:prstGeom>
+          <a:noFill/>
+        </p:spPr>
+        <p:txBody>
+          <a:bodyPr wrap="none" rtlCol="0">
+            <a:spAutoFit/>
+          </a:bodyPr>
+          <a:lstStyle/>
+          <a:p>
+            <a:pPr algn="ctr"/>
+            <a:r>
+              <a:rPr lang="en-US" sz="1200" dirty="0" smtClean="0">
+                <a:latin typeface="Times New Roman"/>
+              </a:rPr>
+              <a:t>System with</a:t>
+            </a:r>
+          </a:p>
+          <a:p>
+            <a:r>
+              <a:rPr lang="en-US" sz="1200" dirty="0" smtClean="0">
+                <a:latin typeface="Times New Roman"/>
+              </a:rPr>
+              <a:t>state </a:t>
+            </a:r>
+            <a:r>
+              <a:rPr lang="en-US" sz="1200" b="1" dirty="0" err="1" smtClean="0">
+                <a:latin typeface="Times New Roman"/>
+              </a:rPr>
+              <a:t>x</a:t>
+            </a:r>
+            <a:endParaRPr lang="en-US" sz="1200" b="1" dirty="0">
+              <a:latin typeface="Times New Roman"/>
+            </a:endParaRPr>
+          </a:p>
+        </p:txBody>
+      </p:sp>
+      <p:sp>
+        <p:nvSpPr>
+          <p:cNvPr id="46" name="Rectangle 45"/>
+          <p:cNvSpPr/>
+          <p:nvPr/>
+        </p:nvSpPr>
+        <p:spPr>
+          <a:xfrm>
+            <a:off x="1773132" y="2369886"/>
+            <a:ext cx="1229725" cy="919071"/>
+          </a:xfrm>
+          <a:prstGeom prst="rect">
+            <a:avLst/>
+          </a:prstGeom>
+          <a:solidFill>
+            <a:schemeClr val="bg1"/>
+          </a:solidFill>
+          <a:ln>
+            <a:solidFill>
+              <a:schemeClr val="tx1"/>
+            </a:solidFill>
+          </a:ln>
+          <a:effectLst/>
+        </p:spPr>
+        <p:style>
+          <a:lnRef idx="1">
+            <a:schemeClr val="accent1"/>
+          </a:lnRef>
+          <a:fillRef idx="3">
+            <a:schemeClr val="accent1"/>
+          </a:fillRef>
+          <a:effectRef idx="2">
+            <a:schemeClr val="accent1"/>
+          </a:effectRef>
+          <a:fontRef idx="minor">
+            <a:schemeClr val="lt1"/>
+          </a:fontRef>
+        </p:style>
+        <p:txBody>
+          <a:bodyPr rtlCol="0" anchor="ctr"/>
+          <a:lstStyle/>
+          <a:p>
+            <a:pPr algn="ctr"/>
+            <a:endParaRPr lang="en-US"/>
+          </a:p>
+        </p:txBody>
+      </p:sp>
+      <p:sp>
+        <p:nvSpPr>
+          <p:cNvPr id="47" name="TextBox 46"/>
+          <p:cNvSpPr txBox="1"/>
+          <p:nvPr/>
+        </p:nvSpPr>
+        <p:spPr>
+          <a:xfrm>
+            <a:off x="1857629" y="2598589"/>
+            <a:ext cx="1060732" cy="461665"/>
+          </a:xfrm>
+          <a:prstGeom prst="rect">
+            <a:avLst/>
+          </a:prstGeom>
+          <a:solidFill>
+            <a:schemeClr val="bg1"/>
+          </a:solidFill>
+        </p:spPr>
+        <p:txBody>
+          <a:bodyPr wrap="none" rtlCol="0">
+            <a:spAutoFit/>
+          </a:bodyPr>
+          <a:lstStyle/>
+          <a:p>
+            <a:pPr algn="ctr"/>
+            <a:r>
+              <a:rPr lang="en-US" sz="1200" dirty="0" smtClean="0">
+                <a:latin typeface="Times New Roman"/>
+              </a:rPr>
+              <a:t>Observer with</a:t>
+            </a:r>
+          </a:p>
+          <a:p>
+            <a:r>
+              <a:rPr lang="en-US" sz="1200" dirty="0" smtClean="0">
+                <a:latin typeface="Times New Roman"/>
+              </a:rPr>
+              <a:t>state</a:t>
+            </a:r>
+            <a:endParaRPr lang="en-US" sz="1200" b="1" dirty="0">
+              <a:latin typeface="Times New Roman"/>
+            </a:endParaRPr>
+          </a:p>
+        </p:txBody>
+      </p:sp>
+      <p:graphicFrame>
+        <p:nvGraphicFramePr>
+          <p:cNvPr id="49" name="Object 48"/>
+          <p:cNvGraphicFramePr>
+            <a:graphicFrameLocks noChangeAspect="1"/>
+          </p:cNvGraphicFramePr>
+          <p:nvPr/>
+        </p:nvGraphicFramePr>
+        <p:xfrm>
+          <a:off x="3223914" y="3587661"/>
+          <a:ext cx="127000" cy="165100"/>
+        </p:xfrm>
+        <a:graphic>
+          <a:graphicData uri="http://schemas.openxmlformats.org/presentationml/2006/ole">
+            <p:oleObj spid="_x0000_s62474" name="Equation" r:id="rId5" imgW="127000" imgH="165100" progId="Equation.DSMT4">
+              <p:embed/>
+            </p:oleObj>
+          </a:graphicData>
+        </a:graphic>
+      </p:graphicFrame>
+      <p:graphicFrame>
+        <p:nvGraphicFramePr>
+          <p:cNvPr id="50" name="Object 49"/>
+          <p:cNvGraphicFramePr>
+            <a:graphicFrameLocks noChangeAspect="1"/>
+          </p:cNvGraphicFramePr>
+          <p:nvPr/>
+        </p:nvGraphicFramePr>
+        <p:xfrm>
+          <a:off x="2572177" y="2840125"/>
+          <a:ext cx="127000" cy="165100"/>
+        </p:xfrm>
+        <a:graphic>
+          <a:graphicData uri="http://schemas.openxmlformats.org/presentationml/2006/ole">
+            <p:oleObj spid="_x0000_s62475" name="Equation" r:id="rId6" imgW="127000" imgH="165100" progId="Equation.DSMT4">
+              <p:embed/>
+            </p:oleObj>
+          </a:graphicData>
+        </a:graphic>
+      </p:graphicFrame>
+      <p:sp>
+        <p:nvSpPr>
+          <p:cNvPr id="52" name="Oval 51"/>
+          <p:cNvSpPr/>
+          <p:nvPr/>
+        </p:nvSpPr>
+        <p:spPr>
+          <a:xfrm>
+            <a:off x="4676849" y="1769891"/>
+            <a:ext cx="278507" cy="278507"/>
+          </a:xfrm>
+          <a:prstGeom prst="ellipse">
+            <a:avLst/>
+          </a:prstGeom>
+          <a:noFill/>
+          <a:ln>
+            <a:solidFill>
+              <a:schemeClr val="tx1"/>
+            </a:solidFill>
+          </a:ln>
+        </p:spPr>
+        <p:style>
+          <a:lnRef idx="1">
+            <a:schemeClr val="accent1"/>
+          </a:lnRef>
+          <a:fillRef idx="3">
+            <a:schemeClr val="accent1"/>
+          </a:fillRef>
+          <a:effectRef idx="2">
+            <a:schemeClr val="accent1"/>
+          </a:effectRef>
+          <a:fontRef idx="minor">
+            <a:schemeClr val="lt1"/>
+          </a:fontRef>
+        </p:style>
+        <p:txBody>
+          <a:bodyPr rtlCol="0" anchor="ctr"/>
+          <a:lstStyle/>
+          <a:p>
+            <a:pPr algn="ctr"/>
+            <a:endParaRPr lang="en-US"/>
+          </a:p>
+        </p:txBody>
+      </p:sp>
+      <p:sp>
+        <p:nvSpPr>
+          <p:cNvPr id="55" name="Rectangle 54"/>
+          <p:cNvSpPr/>
+          <p:nvPr/>
+        </p:nvSpPr>
+        <p:spPr>
+          <a:xfrm>
+            <a:off x="3536784" y="2575037"/>
+            <a:ext cx="614862" cy="508770"/>
+          </a:xfrm>
+          <a:prstGeom prst="rect">
+            <a:avLst/>
+          </a:prstGeom>
+          <a:solidFill>
+            <a:schemeClr val="bg1"/>
+          </a:solidFill>
+          <a:ln>
+            <a:solidFill>
+              <a:schemeClr val="tx1"/>
+            </a:solidFill>
+          </a:ln>
+          <a:effectLst/>
+        </p:spPr>
+        <p:style>
+          <a:lnRef idx="1">
+            <a:schemeClr val="accent1"/>
+          </a:lnRef>
+          <a:fillRef idx="3">
+            <a:schemeClr val="accent1"/>
+          </a:fillRef>
+          <a:effectRef idx="2">
+            <a:schemeClr val="accent1"/>
+          </a:effectRef>
+          <a:fontRef idx="minor">
+            <a:schemeClr val="lt1"/>
+          </a:fontRef>
+        </p:style>
+        <p:txBody>
+          <a:bodyPr rtlCol="0" anchor="ctr"/>
+          <a:lstStyle/>
+          <a:p>
+            <a:pPr algn="ctr"/>
+            <a:endParaRPr lang="en-US"/>
+          </a:p>
+        </p:txBody>
+      </p:sp>
+      <p:sp>
+        <p:nvSpPr>
+          <p:cNvPr id="56" name="TextBox 55"/>
+          <p:cNvSpPr txBox="1"/>
+          <p:nvPr/>
+        </p:nvSpPr>
+        <p:spPr>
+          <a:xfrm>
+            <a:off x="3774548" y="2701640"/>
+            <a:ext cx="139333" cy="276999"/>
+          </a:xfrm>
+          <a:prstGeom prst="rect">
+            <a:avLst/>
+          </a:prstGeom>
+          <a:solidFill>
+            <a:schemeClr val="bg1"/>
+          </a:solidFill>
+        </p:spPr>
+        <p:txBody>
+          <a:bodyPr wrap="square" rtlCol="0">
+            <a:spAutoFit/>
+          </a:bodyPr>
+          <a:lstStyle/>
+          <a:p>
+            <a:pPr algn="ctr"/>
+            <a:endParaRPr lang="en-US" sz="1200" b="1" dirty="0">
+              <a:latin typeface="Times New Roman"/>
+            </a:endParaRPr>
+          </a:p>
+        </p:txBody>
+      </p:sp>
+      <p:sp>
+        <p:nvSpPr>
+          <p:cNvPr id="57" name="TextBox 56"/>
+          <p:cNvSpPr txBox="1"/>
+          <p:nvPr/>
+        </p:nvSpPr>
+        <p:spPr>
+          <a:xfrm>
+            <a:off x="3704806" y="2690922"/>
+            <a:ext cx="295799" cy="276999"/>
+          </a:xfrm>
+          <a:prstGeom prst="rect">
+            <a:avLst/>
+          </a:prstGeom>
+          <a:noFill/>
+        </p:spPr>
+        <p:txBody>
+          <a:bodyPr wrap="none" rtlCol="0">
+            <a:spAutoFit/>
+          </a:bodyPr>
+          <a:lstStyle/>
+          <a:p>
+            <a:r>
+              <a:rPr lang="en-US" sz="1200" b="1" dirty="0" smtClean="0">
+                <a:latin typeface="Times New Roman"/>
+              </a:rPr>
+              <a:t>C</a:t>
+            </a:r>
+            <a:endParaRPr lang="en-US" sz="1200" b="1" dirty="0">
+              <a:latin typeface="Times New Roman"/>
+            </a:endParaRPr>
+          </a:p>
+        </p:txBody>
+      </p:sp>
+      <p:sp>
+        <p:nvSpPr>
+          <p:cNvPr id="59" name="Rectangle 58"/>
+          <p:cNvSpPr/>
+          <p:nvPr/>
+        </p:nvSpPr>
+        <p:spPr>
+          <a:xfrm>
+            <a:off x="3536784" y="1654759"/>
+            <a:ext cx="614862" cy="508770"/>
+          </a:xfrm>
+          <a:prstGeom prst="rect">
+            <a:avLst/>
+          </a:prstGeom>
+          <a:noFill/>
+          <a:ln>
+            <a:solidFill>
+              <a:schemeClr val="tx1"/>
+            </a:solidFill>
+          </a:ln>
+          <a:effectLst/>
+        </p:spPr>
+        <p:style>
+          <a:lnRef idx="1">
+            <a:schemeClr val="accent1"/>
+          </a:lnRef>
+          <a:fillRef idx="3">
+            <a:schemeClr val="accent1"/>
+          </a:fillRef>
+          <a:effectRef idx="2">
+            <a:schemeClr val="accent1"/>
+          </a:effectRef>
+          <a:fontRef idx="minor">
+            <a:schemeClr val="lt1"/>
+          </a:fontRef>
+        </p:style>
+        <p:txBody>
+          <a:bodyPr rtlCol="0" anchor="ctr"/>
+          <a:lstStyle/>
+          <a:p>
+            <a:pPr algn="ctr"/>
+            <a:endParaRPr lang="en-US"/>
+          </a:p>
+        </p:txBody>
+      </p:sp>
+      <p:sp>
+        <p:nvSpPr>
+          <p:cNvPr id="61" name="TextBox 60"/>
+          <p:cNvSpPr txBox="1"/>
+          <p:nvPr/>
+        </p:nvSpPr>
+        <p:spPr>
+          <a:xfrm>
+            <a:off x="3704806" y="1770645"/>
+            <a:ext cx="278817" cy="276999"/>
+          </a:xfrm>
+          <a:prstGeom prst="rect">
+            <a:avLst/>
+          </a:prstGeom>
+          <a:noFill/>
+        </p:spPr>
+        <p:txBody>
+          <a:bodyPr wrap="none" rtlCol="0">
+            <a:spAutoFit/>
+          </a:bodyPr>
+          <a:lstStyle/>
+          <a:p>
+            <a:r>
+              <a:rPr lang="en-US" sz="1200" b="1" dirty="0" smtClean="0">
+                <a:latin typeface="Times New Roman"/>
+              </a:rPr>
+              <a:t>L</a:t>
+            </a:r>
+            <a:endParaRPr lang="en-US" sz="1200" b="1" dirty="0">
+              <a:latin typeface="Times New Roman"/>
+            </a:endParaRPr>
+          </a:p>
+        </p:txBody>
+      </p:sp>
+      <p:cxnSp>
+        <p:nvCxnSpPr>
+          <p:cNvPr id="64" name="Straight Arrow Connector 63"/>
+          <p:cNvCxnSpPr>
+            <a:endCxn id="52" idx="0"/>
+          </p:cNvCxnSpPr>
+          <p:nvPr/>
+        </p:nvCxnSpPr>
+        <p:spPr>
+          <a:xfrm rot="5400000">
+            <a:off x="4440932" y="1394717"/>
+            <a:ext cx="750346" cy="3"/>
+          </a:xfrm>
+          <a:prstGeom prst="straightConnector1">
+            <a:avLst/>
+          </a:prstGeom>
+          <a:ln w="12700">
+            <a:solidFill>
+              <a:schemeClr val="tx1"/>
+            </a:solidFill>
+            <a:tailEnd type="triangle"/>
+          </a:ln>
+          <a:effectLst/>
+        </p:spPr>
+        <p:style>
+          <a:lnRef idx="2">
+            <a:schemeClr val="accent1"/>
+          </a:lnRef>
+          <a:fillRef idx="0">
+            <a:schemeClr val="accent1"/>
+          </a:fillRef>
+          <a:effectRef idx="1">
+            <a:schemeClr val="accent1"/>
+          </a:effectRef>
+          <a:fontRef idx="minor">
+            <a:schemeClr val="tx1"/>
+          </a:fontRef>
+        </p:style>
+      </p:cxnSp>
+      <p:cxnSp>
+        <p:nvCxnSpPr>
+          <p:cNvPr id="67" name="Shape 66"/>
+          <p:cNvCxnSpPr>
+            <a:endCxn id="52" idx="4"/>
+          </p:cNvCxnSpPr>
+          <p:nvPr/>
+        </p:nvCxnSpPr>
+        <p:spPr>
+          <a:xfrm flipV="1">
+            <a:off x="4151646" y="2048398"/>
+            <a:ext cx="664457" cy="781024"/>
+          </a:xfrm>
+          <a:prstGeom prst="bentConnector2">
+            <a:avLst/>
+          </a:prstGeom>
+          <a:ln w="12700">
+            <a:solidFill>
+              <a:schemeClr val="tx1"/>
+            </a:solidFill>
+            <a:tailEnd type="triangle"/>
+          </a:ln>
+          <a:effectLst/>
+        </p:spPr>
+        <p:style>
+          <a:lnRef idx="2">
+            <a:schemeClr val="accent1"/>
+          </a:lnRef>
+          <a:fillRef idx="0">
+            <a:schemeClr val="accent1"/>
+          </a:fillRef>
+          <a:effectRef idx="1">
+            <a:schemeClr val="accent1"/>
+          </a:effectRef>
+          <a:fontRef idx="minor">
+            <a:schemeClr val="tx1"/>
+          </a:fontRef>
+        </p:style>
+      </p:cxnSp>
+      <p:cxnSp>
+        <p:nvCxnSpPr>
+          <p:cNvPr id="69" name="Straight Arrow Connector 68"/>
+          <p:cNvCxnSpPr>
+            <a:stCxn id="52" idx="2"/>
+          </p:cNvCxnSpPr>
+          <p:nvPr/>
+        </p:nvCxnSpPr>
+        <p:spPr>
+          <a:xfrm rot="10800000">
+            <a:off x="4151647" y="1909145"/>
+            <a:ext cx="525203" cy="1"/>
+          </a:xfrm>
+          <a:prstGeom prst="straightConnector1">
+            <a:avLst/>
+          </a:prstGeom>
+          <a:ln w="12700">
+            <a:solidFill>
+              <a:schemeClr val="tx1"/>
+            </a:solidFill>
+            <a:tailEnd type="triangle"/>
+          </a:ln>
+          <a:effectLst/>
+        </p:spPr>
+        <p:style>
+          <a:lnRef idx="2">
+            <a:schemeClr val="accent1"/>
+          </a:lnRef>
+          <a:fillRef idx="0">
+            <a:schemeClr val="accent1"/>
+          </a:fillRef>
+          <a:effectRef idx="1">
+            <a:schemeClr val="accent1"/>
+          </a:effectRef>
+          <a:fontRef idx="minor">
+            <a:schemeClr val="tx1"/>
+          </a:fontRef>
+        </p:style>
+      </p:cxnSp>
+      <p:graphicFrame>
+        <p:nvGraphicFramePr>
+          <p:cNvPr id="75" name="Object 74"/>
+          <p:cNvGraphicFramePr>
+            <a:graphicFrameLocks noChangeAspect="1"/>
+          </p:cNvGraphicFramePr>
+          <p:nvPr/>
+        </p:nvGraphicFramePr>
+        <p:xfrm>
+          <a:off x="4409851" y="2897293"/>
+          <a:ext cx="228600" cy="165100"/>
+        </p:xfrm>
+        <a:graphic>
+          <a:graphicData uri="http://schemas.openxmlformats.org/presentationml/2006/ole">
+            <p:oleObj spid="_x0000_s62476" name="Equation" r:id="rId7" imgW="228600" imgH="165100" progId="Equation.DSMT4">
+              <p:embed/>
+            </p:oleObj>
+          </a:graphicData>
+        </a:graphic>
+      </p:graphicFrame>
+      <p:sp>
+        <p:nvSpPr>
+          <p:cNvPr id="76" name="TextBox 75"/>
+          <p:cNvSpPr txBox="1"/>
+          <p:nvPr/>
+        </p:nvSpPr>
+        <p:spPr>
+          <a:xfrm>
+            <a:off x="4543284" y="1471621"/>
+            <a:ext cx="274434" cy="276999"/>
+          </a:xfrm>
+          <a:prstGeom prst="rect">
+            <a:avLst/>
+          </a:prstGeom>
+          <a:noFill/>
+        </p:spPr>
+        <p:txBody>
+          <a:bodyPr wrap="square" rtlCol="0">
+            <a:spAutoFit/>
+          </a:bodyPr>
+          <a:lstStyle/>
+          <a:p>
+            <a:r>
+              <a:rPr lang="en-US" sz="1200" dirty="0" smtClean="0">
+                <a:latin typeface="Symbol"/>
+              </a:rPr>
+              <a:t>+</a:t>
+            </a:r>
+            <a:endParaRPr lang="en-US" sz="1200" dirty="0">
+              <a:latin typeface="Symbol"/>
+            </a:endParaRPr>
+          </a:p>
+        </p:txBody>
+      </p:sp>
+      <p:sp>
+        <p:nvSpPr>
+          <p:cNvPr id="77" name="TextBox 76"/>
+          <p:cNvSpPr txBox="1"/>
+          <p:nvPr/>
+        </p:nvSpPr>
+        <p:spPr>
+          <a:xfrm>
+            <a:off x="4539632" y="2007707"/>
+            <a:ext cx="274434" cy="276999"/>
+          </a:xfrm>
+          <a:prstGeom prst="rect">
+            <a:avLst/>
+          </a:prstGeom>
+          <a:noFill/>
+        </p:spPr>
+        <p:txBody>
+          <a:bodyPr wrap="square" rtlCol="0">
+            <a:spAutoFit/>
+          </a:bodyPr>
+          <a:lstStyle/>
+          <a:p>
+            <a:r>
+              <a:rPr lang="en-US" sz="1200" dirty="0" smtClean="0">
+                <a:latin typeface="Symbol"/>
+              </a:rPr>
+              <a:t>-</a:t>
             </a:r>
             <a:endParaRPr lang="en-US" sz="1200" dirty="0">
               <a:latin typeface="Symbol"/>

</xml_diff>

<commit_message>
Lecture 21 ready for upload to Blackboard
</commit_message>
<xml_diff>
--- a/DigitalSystems/Lecture12/pictures/pictures-converted.pptx
+++ b/DigitalSystems/Lecture12/pictures/pictures-converted.pptx
@@ -213,7 +213,7 @@
             <a:fld id="{57664937-CC7E-1147-954A-F42817EF7E06}" type="datetimeFigureOut">
               <a:rPr lang="en-US" smtClean="0"/>
               <a:pPr/>
-              <a:t>2/6/10</a:t>
+              <a:t>2/8/10</a:t>
             </a:fld>
             <a:endParaRPr lang="en-US"/>
           </a:p>
@@ -743,7 +743,7 @@
             <a:fld id="{5D51CFD4-D50C-3141-B28B-5C3A3C05403C}" type="datetimeFigureOut">
               <a:rPr lang="en-US" smtClean="0"/>
               <a:pPr/>
-              <a:t>2/6/10</a:t>
+              <a:t>2/8/10</a:t>
             </a:fld>
             <a:endParaRPr lang="en-US"/>
           </a:p>
@@ -910,7 +910,7 @@
             <a:fld id="{5D51CFD4-D50C-3141-B28B-5C3A3C05403C}" type="datetimeFigureOut">
               <a:rPr lang="en-US" smtClean="0"/>
               <a:pPr/>
-              <a:t>2/6/10</a:t>
+              <a:t>2/8/10</a:t>
             </a:fld>
             <a:endParaRPr lang="en-US"/>
           </a:p>
@@ -1087,7 +1087,7 @@
             <a:fld id="{5D51CFD4-D50C-3141-B28B-5C3A3C05403C}" type="datetimeFigureOut">
               <a:rPr lang="en-US" smtClean="0"/>
               <a:pPr/>
-              <a:t>2/6/10</a:t>
+              <a:t>2/8/10</a:t>
             </a:fld>
             <a:endParaRPr lang="en-US"/>
           </a:p>
@@ -1254,7 +1254,7 @@
             <a:fld id="{5D51CFD4-D50C-3141-B28B-5C3A3C05403C}" type="datetimeFigureOut">
               <a:rPr lang="en-US" smtClean="0"/>
               <a:pPr/>
-              <a:t>2/6/10</a:t>
+              <a:t>2/8/10</a:t>
             </a:fld>
             <a:endParaRPr lang="en-US"/>
           </a:p>
@@ -1497,7 +1497,7 @@
             <a:fld id="{5D51CFD4-D50C-3141-B28B-5C3A3C05403C}" type="datetimeFigureOut">
               <a:rPr lang="en-US" smtClean="0"/>
               <a:pPr/>
-              <a:t>2/6/10</a:t>
+              <a:t>2/8/10</a:t>
             </a:fld>
             <a:endParaRPr lang="en-US"/>
           </a:p>
@@ -1782,7 +1782,7 @@
             <a:fld id="{5D51CFD4-D50C-3141-B28B-5C3A3C05403C}" type="datetimeFigureOut">
               <a:rPr lang="en-US" smtClean="0"/>
               <a:pPr/>
-              <a:t>2/6/10</a:t>
+              <a:t>2/8/10</a:t>
             </a:fld>
             <a:endParaRPr lang="en-US"/>
           </a:p>
@@ -2201,7 +2201,7 @@
             <a:fld id="{5D51CFD4-D50C-3141-B28B-5C3A3C05403C}" type="datetimeFigureOut">
               <a:rPr lang="en-US" smtClean="0"/>
               <a:pPr/>
-              <a:t>2/6/10</a:t>
+              <a:t>2/8/10</a:t>
             </a:fld>
             <a:endParaRPr lang="en-US"/>
           </a:p>
@@ -2316,7 +2316,7 @@
             <a:fld id="{5D51CFD4-D50C-3141-B28B-5C3A3C05403C}" type="datetimeFigureOut">
               <a:rPr lang="en-US" smtClean="0"/>
               <a:pPr/>
-              <a:t>2/6/10</a:t>
+              <a:t>2/8/10</a:t>
             </a:fld>
             <a:endParaRPr lang="en-US"/>
           </a:p>
@@ -2408,7 +2408,7 @@
             <a:fld id="{5D51CFD4-D50C-3141-B28B-5C3A3C05403C}" type="datetimeFigureOut">
               <a:rPr lang="en-US" smtClean="0"/>
               <a:pPr/>
-              <a:t>2/6/10</a:t>
+              <a:t>2/8/10</a:t>
             </a:fld>
             <a:endParaRPr lang="en-US"/>
           </a:p>
@@ -2682,7 +2682,7 @@
             <a:fld id="{5D51CFD4-D50C-3141-B28B-5C3A3C05403C}" type="datetimeFigureOut">
               <a:rPr lang="en-US" smtClean="0"/>
               <a:pPr/>
-              <a:t>2/6/10</a:t>
+              <a:t>2/8/10</a:t>
             </a:fld>
             <a:endParaRPr lang="en-US"/>
           </a:p>
@@ -2932,7 +2932,7 @@
             <a:fld id="{5D51CFD4-D50C-3141-B28B-5C3A3C05403C}" type="datetimeFigureOut">
               <a:rPr lang="en-US" smtClean="0"/>
               <a:pPr/>
-              <a:t>2/6/10</a:t>
+              <a:t>2/8/10</a:t>
             </a:fld>
             <a:endParaRPr lang="en-US"/>
           </a:p>
@@ -3142,7 +3142,7 @@
             <a:fld id="{5D51CFD4-D50C-3141-B28B-5C3A3C05403C}" type="datetimeFigureOut">
               <a:rPr lang="en-US" smtClean="0"/>
               <a:pPr/>
-              <a:t>2/6/10</a:t>
+              <a:t>2/8/10</a:t>
             </a:fld>
             <a:endParaRPr lang="en-US"/>
           </a:p>
@@ -3570,7 +3570,7 @@
               </a:stretch>
             </p:blipFill>
           </mc:Choice>
-          <mc:Fallback xmlns:ma="http://schemas.microsoft.com/office/mac/drawingml/2008/main" xmlns="" xmlns:a="http://schemas.openxmlformats.org/drawingml/2006/main" xmlns:r="http://schemas.openxmlformats.org/officeDocument/2006/relationships" xmlns:mc="http://schemas.openxmlformats.org/markup-compatibility/2006" xmlns:mv="urn:schemas-microsoft-com:mac:vml" xmlns:p="http://schemas.openxmlformats.org/presentationml/2006/main">
+          <mc:Fallback xmlns:p="http://schemas.openxmlformats.org/presentationml/2006/main" xmlns:mv="urn:schemas-microsoft-com:mac:vml" xmlns:mc="http://schemas.openxmlformats.org/markup-compatibility/2006" xmlns:r="http://schemas.openxmlformats.org/officeDocument/2006/relationships" xmlns:a="http://schemas.openxmlformats.org/drawingml/2006/main" xmlns="" xmlns:ma="http://schemas.microsoft.com/office/mac/drawingml/2008/main">
             <p:blipFill>
               <a:blip r:embed="rId3"/>
               <a:stretch>
@@ -3674,7 +3674,7 @@
               </a:stretch>
             </p:blipFill>
           </mc:Choice>
-          <mc:Fallback xmlns:ma="http://schemas.microsoft.com/office/mac/drawingml/2008/main" xmlns="" xmlns:a="http://schemas.openxmlformats.org/drawingml/2006/main" xmlns:r="http://schemas.openxmlformats.org/officeDocument/2006/relationships" xmlns:mc="http://schemas.openxmlformats.org/markup-compatibility/2006" xmlns:mv="urn:schemas-microsoft-com:mac:vml" xmlns:p="http://schemas.openxmlformats.org/presentationml/2006/main">
+          <mc:Fallback xmlns:p="http://schemas.openxmlformats.org/presentationml/2006/main" xmlns:mv="urn:schemas-microsoft-com:mac:vml" xmlns:mc="http://schemas.openxmlformats.org/markup-compatibility/2006" xmlns:r="http://schemas.openxmlformats.org/officeDocument/2006/relationships" xmlns:a="http://schemas.openxmlformats.org/drawingml/2006/main" xmlns="" xmlns:ma="http://schemas.microsoft.com/office/mac/drawingml/2008/main">
             <p:blipFill>
               <a:blip r:embed="rId5"/>
               <a:stretch>
@@ -3744,7 +3744,7 @@
               </a:stretch>
             </p:blipFill>
           </mc:Choice>
-          <mc:Fallback xmlns:ma="http://schemas.microsoft.com/office/mac/drawingml/2008/main" xmlns="" xmlns:a="http://schemas.openxmlformats.org/drawingml/2006/main" xmlns:r="http://schemas.openxmlformats.org/officeDocument/2006/relationships" xmlns:mc="http://schemas.openxmlformats.org/markup-compatibility/2006" xmlns:mv="urn:schemas-microsoft-com:mac:vml" xmlns:p="http://schemas.openxmlformats.org/presentationml/2006/main">
+          <mc:Fallback xmlns:p="http://schemas.openxmlformats.org/presentationml/2006/main" xmlns:mv="urn:schemas-microsoft-com:mac:vml" xmlns:mc="http://schemas.openxmlformats.org/markup-compatibility/2006" xmlns:r="http://schemas.openxmlformats.org/officeDocument/2006/relationships" xmlns:a="http://schemas.openxmlformats.org/drawingml/2006/main" xmlns="" xmlns:ma="http://schemas.microsoft.com/office/mac/drawingml/2008/main">
             <p:blipFill>
               <a:blip r:embed="rId7"/>
               <a:stretch>
@@ -3848,7 +3848,7 @@
               </a:stretch>
             </p:blipFill>
           </mc:Choice>
-          <mc:Fallback xmlns:ma="http://schemas.microsoft.com/office/mac/drawingml/2008/main" xmlns="" xmlns:a="http://schemas.openxmlformats.org/drawingml/2006/main" xmlns:r="http://schemas.openxmlformats.org/officeDocument/2006/relationships" xmlns:mc="http://schemas.openxmlformats.org/markup-compatibility/2006" xmlns:mv="urn:schemas-microsoft-com:mac:vml" xmlns:p="http://schemas.openxmlformats.org/presentationml/2006/main">
+          <mc:Fallback xmlns:p="http://schemas.openxmlformats.org/presentationml/2006/main" xmlns:mv="urn:schemas-microsoft-com:mac:vml" xmlns:mc="http://schemas.openxmlformats.org/markup-compatibility/2006" xmlns:r="http://schemas.openxmlformats.org/officeDocument/2006/relationships" xmlns:a="http://schemas.openxmlformats.org/drawingml/2006/main" xmlns="" xmlns:ma="http://schemas.microsoft.com/office/mac/drawingml/2008/main">
             <p:blipFill>
               <a:blip r:embed="rId9"/>
               <a:stretch>
@@ -3986,7 +3986,7 @@
               </a:stretch>
             </p:blipFill>
           </mc:Choice>
-          <mc:Fallback xmlns:ma="http://schemas.microsoft.com/office/mac/drawingml/2008/main" xmlns="" xmlns:a="http://schemas.openxmlformats.org/drawingml/2006/main" xmlns:r="http://schemas.openxmlformats.org/officeDocument/2006/relationships" xmlns:mc="http://schemas.openxmlformats.org/markup-compatibility/2006" xmlns:mv="urn:schemas-microsoft-com:mac:vml" xmlns:p="http://schemas.openxmlformats.org/presentationml/2006/main">
+          <mc:Fallback xmlns:p="http://schemas.openxmlformats.org/presentationml/2006/main" xmlns:mv="urn:schemas-microsoft-com:mac:vml" xmlns:mc="http://schemas.openxmlformats.org/markup-compatibility/2006" xmlns:r="http://schemas.openxmlformats.org/officeDocument/2006/relationships" xmlns:a="http://schemas.openxmlformats.org/drawingml/2006/main" xmlns="" xmlns:ma="http://schemas.microsoft.com/office/mac/drawingml/2008/main">
             <p:blipFill>
               <a:blip r:embed="rId11"/>
               <a:stretch>
@@ -4232,7 +4232,7 @@
               </a:stretch>
             </p:blipFill>
           </mc:Choice>
-          <mc:Fallback xmlns:ma="http://schemas.microsoft.com/office/mac/drawingml/2008/main" xmlns="" xmlns:a="http://schemas.openxmlformats.org/drawingml/2006/main" xmlns:r="http://schemas.openxmlformats.org/officeDocument/2006/relationships" xmlns:mc="http://schemas.openxmlformats.org/markup-compatibility/2006" xmlns:mv="urn:schemas-microsoft-com:mac:vml" xmlns:p="http://schemas.openxmlformats.org/presentationml/2006/main">
+          <mc:Fallback xmlns:p="http://schemas.openxmlformats.org/presentationml/2006/main" xmlns:mv="urn:schemas-microsoft-com:mac:vml" xmlns:mc="http://schemas.openxmlformats.org/markup-compatibility/2006" xmlns:r="http://schemas.openxmlformats.org/officeDocument/2006/relationships" xmlns:a="http://schemas.openxmlformats.org/drawingml/2006/main" xmlns="" xmlns:ma="http://schemas.microsoft.com/office/mac/drawingml/2008/main">
             <p:blipFill>
               <a:blip r:embed="rId13"/>
               <a:stretch>
@@ -14479,6 +14479,1709 @@
           </a:p>
         </p:txBody>
       </p:sp>
+      <p:grpSp>
+        <p:nvGrpSpPr>
+          <p:cNvPr id="135" name="Group 134"/>
+          <p:cNvGrpSpPr/>
+          <p:nvPr/>
+        </p:nvGrpSpPr>
+        <p:grpSpPr>
+          <a:xfrm>
+            <a:off x="3964689" y="2614563"/>
+            <a:ext cx="4853809" cy="3544930"/>
+            <a:chOff x="3964689" y="2614563"/>
+            <a:chExt cx="4853809" cy="3544930"/>
+          </a:xfrm>
+        </p:grpSpPr>
+        <p:sp>
+          <p:nvSpPr>
+            <p:cNvPr id="42" name="Rectangle 41"/>
+            <p:cNvSpPr/>
+            <p:nvPr/>
+          </p:nvSpPr>
+          <p:spPr>
+            <a:xfrm>
+              <a:off x="5833574" y="4488005"/>
+              <a:ext cx="614862" cy="508770"/>
+            </a:xfrm>
+            <a:prstGeom prst="rect">
+              <a:avLst/>
+            </a:prstGeom>
+            <a:solidFill>
+              <a:schemeClr val="bg1"/>
+            </a:solidFill>
+            <a:ln>
+              <a:solidFill>
+                <a:schemeClr val="tx1"/>
+              </a:solidFill>
+            </a:ln>
+            <a:effectLst/>
+          </p:spPr>
+          <p:style>
+            <a:lnRef idx="1">
+              <a:schemeClr val="accent1"/>
+            </a:lnRef>
+            <a:fillRef idx="3">
+              <a:schemeClr val="accent1"/>
+            </a:fillRef>
+            <a:effectRef idx="2">
+              <a:schemeClr val="accent1"/>
+            </a:effectRef>
+            <a:fontRef idx="minor">
+              <a:schemeClr val="lt1"/>
+            </a:fontRef>
+          </p:style>
+          <p:txBody>
+            <a:bodyPr rtlCol="0" anchor="ctr"/>
+            <a:lstStyle/>
+            <a:p>
+              <a:pPr algn="ctr"/>
+              <a:endParaRPr lang="en-US"/>
+            </a:p>
+          </p:txBody>
+        </p:sp>
+        <p:graphicFrame>
+          <p:nvGraphicFramePr>
+            <p:cNvPr id="45" name="Object 44"/>
+            <p:cNvGraphicFramePr>
+              <a:graphicFrameLocks noChangeAspect="1"/>
+            </p:cNvGraphicFramePr>
+            <p:nvPr/>
+          </p:nvGraphicFramePr>
+          <p:xfrm>
+            <a:off x="6064758" y="4545540"/>
+            <a:ext cx="139700" cy="393700"/>
+          </p:xfrm>
+          <a:graphic>
+            <a:graphicData uri="http://schemas.openxmlformats.org/presentationml/2006/ole">
+              <p:oleObj spid="_x0000_s62479" name="Equation" r:id="rId8" imgW="139700" imgH="393700" progId="Equation.DSMT4">
+                <p:embed/>
+              </p:oleObj>
+            </a:graphicData>
+          </a:graphic>
+        </p:graphicFrame>
+        <p:sp>
+          <p:nvSpPr>
+            <p:cNvPr id="48" name="Rectangle 47"/>
+            <p:cNvSpPr/>
+            <p:nvPr/>
+          </p:nvSpPr>
+          <p:spPr>
+            <a:xfrm>
+              <a:off x="7285042" y="4488005"/>
+              <a:ext cx="614862" cy="508770"/>
+            </a:xfrm>
+            <a:prstGeom prst="rect">
+              <a:avLst/>
+            </a:prstGeom>
+            <a:solidFill>
+              <a:schemeClr val="bg1"/>
+            </a:solidFill>
+            <a:ln>
+              <a:solidFill>
+                <a:schemeClr val="tx1"/>
+              </a:solidFill>
+            </a:ln>
+            <a:effectLst/>
+          </p:spPr>
+          <p:style>
+            <a:lnRef idx="1">
+              <a:schemeClr val="accent1"/>
+            </a:lnRef>
+            <a:fillRef idx="3">
+              <a:schemeClr val="accent1"/>
+            </a:fillRef>
+            <a:effectRef idx="2">
+              <a:schemeClr val="accent1"/>
+            </a:effectRef>
+            <a:fontRef idx="minor">
+              <a:schemeClr val="lt1"/>
+            </a:fontRef>
+          </p:style>
+          <p:txBody>
+            <a:bodyPr rtlCol="0" anchor="ctr"/>
+            <a:lstStyle/>
+            <a:p>
+              <a:pPr algn="ctr"/>
+              <a:endParaRPr lang="en-US"/>
+            </a:p>
+          </p:txBody>
+        </p:sp>
+        <p:graphicFrame>
+          <p:nvGraphicFramePr>
+            <p:cNvPr id="51" name="Object 50"/>
+            <p:cNvGraphicFramePr>
+              <a:graphicFrameLocks noChangeAspect="1"/>
+            </p:cNvGraphicFramePr>
+            <p:nvPr/>
+          </p:nvGraphicFramePr>
+          <p:xfrm>
+            <a:off x="7516226" y="4545540"/>
+            <a:ext cx="139700" cy="393700"/>
+          </p:xfrm>
+          <a:graphic>
+            <a:graphicData uri="http://schemas.openxmlformats.org/presentationml/2006/ole">
+              <p:oleObj spid="_x0000_s62480" name="Equation" r:id="rId9" imgW="139700" imgH="393700" progId="Equation.DSMT4">
+                <p:embed/>
+              </p:oleObj>
+            </a:graphicData>
+          </a:graphic>
+        </p:graphicFrame>
+        <p:sp>
+          <p:nvSpPr>
+            <p:cNvPr id="54" name="Isosceles Triangle 53"/>
+            <p:cNvSpPr/>
+            <p:nvPr/>
+          </p:nvSpPr>
+          <p:spPr>
+            <a:xfrm flipV="1">
+              <a:off x="6584229" y="3758426"/>
+              <a:ext cx="559144" cy="468322"/>
+            </a:xfrm>
+            <a:prstGeom prst="triangle">
+              <a:avLst/>
+            </a:prstGeom>
+            <a:solidFill>
+              <a:schemeClr val="bg1"/>
+            </a:solidFill>
+            <a:ln>
+              <a:solidFill>
+                <a:schemeClr val="tx1"/>
+              </a:solidFill>
+            </a:ln>
+            <a:effectLst/>
+          </p:spPr>
+          <p:style>
+            <a:lnRef idx="1">
+              <a:schemeClr val="accent1"/>
+            </a:lnRef>
+            <a:fillRef idx="3">
+              <a:schemeClr val="accent1"/>
+            </a:fillRef>
+            <a:effectRef idx="2">
+              <a:schemeClr val="accent1"/>
+            </a:effectRef>
+            <a:fontRef idx="minor">
+              <a:schemeClr val="lt1"/>
+            </a:fontRef>
+          </p:style>
+          <p:txBody>
+            <a:bodyPr rtlCol="0" anchor="ctr"/>
+            <a:lstStyle/>
+            <a:p>
+              <a:pPr algn="ctr"/>
+              <a:endParaRPr lang="en-US"/>
+            </a:p>
+          </p:txBody>
+        </p:sp>
+        <p:sp>
+          <p:nvSpPr>
+            <p:cNvPr id="58" name="Oval 57"/>
+            <p:cNvSpPr/>
+            <p:nvPr/>
+          </p:nvSpPr>
+          <p:spPr>
+            <a:xfrm>
+              <a:off x="6724548" y="4603137"/>
+              <a:ext cx="278507" cy="278507"/>
+            </a:xfrm>
+            <a:prstGeom prst="ellipse">
+              <a:avLst/>
+            </a:prstGeom>
+            <a:noFill/>
+            <a:ln>
+              <a:solidFill>
+                <a:schemeClr val="tx1"/>
+              </a:solidFill>
+            </a:ln>
+          </p:spPr>
+          <p:style>
+            <a:lnRef idx="1">
+              <a:schemeClr val="accent1"/>
+            </a:lnRef>
+            <a:fillRef idx="3">
+              <a:schemeClr val="accent1"/>
+            </a:fillRef>
+            <a:effectRef idx="2">
+              <a:schemeClr val="accent1"/>
+            </a:effectRef>
+            <a:fontRef idx="minor">
+              <a:schemeClr val="lt1"/>
+            </a:fontRef>
+          </p:style>
+          <p:txBody>
+            <a:bodyPr rtlCol="0" anchor="ctr"/>
+            <a:lstStyle/>
+            <a:p>
+              <a:pPr algn="ctr"/>
+              <a:endParaRPr lang="en-US"/>
+            </a:p>
+          </p:txBody>
+        </p:sp>
+        <p:cxnSp>
+          <p:nvCxnSpPr>
+            <p:cNvPr id="60" name="Straight Arrow Connector 59"/>
+            <p:cNvCxnSpPr>
+              <a:stCxn id="42" idx="3"/>
+              <a:endCxn id="58" idx="2"/>
+            </p:cNvCxnSpPr>
+            <p:nvPr/>
+          </p:nvCxnSpPr>
+          <p:spPr>
+            <a:xfrm>
+              <a:off x="6448436" y="4742390"/>
+              <a:ext cx="276112" cy="1"/>
+            </a:xfrm>
+            <a:prstGeom prst="straightConnector1">
+              <a:avLst/>
+            </a:prstGeom>
+            <a:ln w="12700">
+              <a:solidFill>
+                <a:schemeClr val="tx1"/>
+              </a:solidFill>
+              <a:tailEnd type="triangle"/>
+            </a:ln>
+            <a:effectLst/>
+          </p:spPr>
+          <p:style>
+            <a:lnRef idx="2">
+              <a:schemeClr val="accent1"/>
+            </a:lnRef>
+            <a:fillRef idx="0">
+              <a:schemeClr val="accent1"/>
+            </a:fillRef>
+            <a:effectRef idx="1">
+              <a:schemeClr val="accent1"/>
+            </a:effectRef>
+            <a:fontRef idx="minor">
+              <a:schemeClr val="tx1"/>
+            </a:fontRef>
+          </p:style>
+        </p:cxnSp>
+        <p:cxnSp>
+          <p:nvCxnSpPr>
+            <p:cNvPr id="65" name="Straight Arrow Connector 64"/>
+            <p:cNvCxnSpPr/>
+            <p:nvPr/>
+          </p:nvCxnSpPr>
+          <p:spPr>
+            <a:xfrm>
+              <a:off x="7003055" y="4742389"/>
+              <a:ext cx="276112" cy="1"/>
+            </a:xfrm>
+            <a:prstGeom prst="straightConnector1">
+              <a:avLst/>
+            </a:prstGeom>
+            <a:ln w="12700">
+              <a:solidFill>
+                <a:schemeClr val="tx1"/>
+              </a:solidFill>
+              <a:tailEnd type="triangle"/>
+            </a:ln>
+            <a:effectLst/>
+          </p:spPr>
+          <p:style>
+            <a:lnRef idx="2">
+              <a:schemeClr val="accent1"/>
+            </a:lnRef>
+            <a:fillRef idx="0">
+              <a:schemeClr val="accent1"/>
+            </a:fillRef>
+            <a:effectRef idx="1">
+              <a:schemeClr val="accent1"/>
+            </a:effectRef>
+            <a:fontRef idx="minor">
+              <a:schemeClr val="tx1"/>
+            </a:fontRef>
+          </p:style>
+        </p:cxnSp>
+        <p:cxnSp>
+          <p:nvCxnSpPr>
+            <p:cNvPr id="66" name="Straight Arrow Connector 65"/>
+            <p:cNvCxnSpPr>
+              <a:stCxn id="54" idx="0"/>
+            </p:cNvCxnSpPr>
+            <p:nvPr/>
+          </p:nvCxnSpPr>
+          <p:spPr>
+            <a:xfrm rot="5400000">
+              <a:off x="6679268" y="4408975"/>
+              <a:ext cx="366761" cy="2306"/>
+            </a:xfrm>
+            <a:prstGeom prst="straightConnector1">
+              <a:avLst/>
+            </a:prstGeom>
+            <a:ln w="12700">
+              <a:solidFill>
+                <a:schemeClr val="tx1"/>
+              </a:solidFill>
+              <a:tailEnd type="triangle"/>
+            </a:ln>
+            <a:effectLst/>
+          </p:spPr>
+          <p:style>
+            <a:lnRef idx="2">
+              <a:schemeClr val="accent1"/>
+            </a:lnRef>
+            <a:fillRef idx="0">
+              <a:schemeClr val="accent1"/>
+            </a:fillRef>
+            <a:effectRef idx="1">
+              <a:schemeClr val="accent1"/>
+            </a:effectRef>
+            <a:fontRef idx="minor">
+              <a:schemeClr val="tx1"/>
+            </a:fontRef>
+          </p:style>
+        </p:cxnSp>
+        <p:sp>
+          <p:nvSpPr>
+            <p:cNvPr id="70" name="Isosceles Triangle 69"/>
+            <p:cNvSpPr/>
+            <p:nvPr/>
+          </p:nvSpPr>
+          <p:spPr>
+            <a:xfrm>
+              <a:off x="6581922" y="5281172"/>
+              <a:ext cx="559144" cy="468322"/>
+            </a:xfrm>
+            <a:prstGeom prst="triangle">
+              <a:avLst/>
+            </a:prstGeom>
+            <a:solidFill>
+              <a:schemeClr val="bg1"/>
+            </a:solidFill>
+            <a:ln>
+              <a:solidFill>
+                <a:schemeClr val="tx1"/>
+              </a:solidFill>
+            </a:ln>
+            <a:effectLst/>
+          </p:spPr>
+          <p:style>
+            <a:lnRef idx="1">
+              <a:schemeClr val="accent1"/>
+            </a:lnRef>
+            <a:fillRef idx="3">
+              <a:schemeClr val="accent1"/>
+            </a:fillRef>
+            <a:effectRef idx="2">
+              <a:schemeClr val="accent1"/>
+            </a:effectRef>
+            <a:fontRef idx="minor">
+              <a:schemeClr val="lt1"/>
+            </a:fontRef>
+          </p:style>
+          <p:txBody>
+            <a:bodyPr rtlCol="0" anchor="ctr"/>
+            <a:lstStyle/>
+            <a:p>
+              <a:pPr algn="ctr"/>
+              <a:endParaRPr lang="en-US"/>
+            </a:p>
+          </p:txBody>
+        </p:sp>
+        <p:cxnSp>
+          <p:nvCxnSpPr>
+            <p:cNvPr id="71" name="Straight Arrow Connector 70"/>
+            <p:cNvCxnSpPr>
+              <a:stCxn id="70" idx="0"/>
+            </p:cNvCxnSpPr>
+            <p:nvPr/>
+          </p:nvCxnSpPr>
+          <p:spPr>
+            <a:xfrm rot="5400000" flipH="1" flipV="1">
+              <a:off x="6662884" y="5080254"/>
+              <a:ext cx="399528" cy="2308"/>
+            </a:xfrm>
+            <a:prstGeom prst="straightConnector1">
+              <a:avLst/>
+            </a:prstGeom>
+            <a:ln w="12700">
+              <a:solidFill>
+                <a:schemeClr val="tx1"/>
+              </a:solidFill>
+              <a:tailEnd type="triangle"/>
+            </a:ln>
+            <a:effectLst/>
+          </p:spPr>
+          <p:style>
+            <a:lnRef idx="2">
+              <a:schemeClr val="accent1"/>
+            </a:lnRef>
+            <a:fillRef idx="0">
+              <a:schemeClr val="accent1"/>
+            </a:fillRef>
+            <a:effectRef idx="1">
+              <a:schemeClr val="accent1"/>
+            </a:effectRef>
+            <a:fontRef idx="minor">
+              <a:schemeClr val="tx1"/>
+            </a:fontRef>
+          </p:style>
+        </p:cxnSp>
+        <p:cxnSp>
+          <p:nvCxnSpPr>
+            <p:cNvPr id="78" name="Straight Arrow Connector 77"/>
+            <p:cNvCxnSpPr/>
+            <p:nvPr/>
+          </p:nvCxnSpPr>
+          <p:spPr>
+            <a:xfrm>
+              <a:off x="7899904" y="4742388"/>
+              <a:ext cx="918594" cy="1588"/>
+            </a:xfrm>
+            <a:prstGeom prst="straightConnector1">
+              <a:avLst/>
+            </a:prstGeom>
+            <a:ln w="12700">
+              <a:solidFill>
+                <a:schemeClr val="tx1"/>
+              </a:solidFill>
+              <a:tailEnd type="triangle"/>
+            </a:ln>
+            <a:effectLst/>
+          </p:spPr>
+          <p:style>
+            <a:lnRef idx="2">
+              <a:schemeClr val="accent1"/>
+            </a:lnRef>
+            <a:fillRef idx="0">
+              <a:schemeClr val="accent1"/>
+            </a:fillRef>
+            <a:effectRef idx="1">
+              <a:schemeClr val="accent1"/>
+            </a:effectRef>
+            <a:fontRef idx="minor">
+              <a:schemeClr val="tx1"/>
+            </a:fontRef>
+          </p:style>
+        </p:cxnSp>
+        <p:grpSp>
+          <p:nvGrpSpPr>
+            <p:cNvPr id="87" name="Group 86"/>
+            <p:cNvGrpSpPr/>
+            <p:nvPr/>
+          </p:nvGrpSpPr>
+          <p:grpSpPr>
+            <a:xfrm>
+              <a:off x="4999322" y="3758426"/>
+              <a:ext cx="830731" cy="1991068"/>
+              <a:chOff x="4999322" y="3771906"/>
+              <a:chExt cx="830731" cy="1991068"/>
+            </a:xfrm>
+          </p:grpSpPr>
+          <p:sp>
+            <p:nvSpPr>
+              <p:cNvPr id="80" name="Isosceles Triangle 79"/>
+              <p:cNvSpPr/>
+              <p:nvPr/>
+            </p:nvSpPr>
+            <p:spPr>
+              <a:xfrm flipV="1">
+                <a:off x="5135115" y="3771906"/>
+                <a:ext cx="559144" cy="468322"/>
+              </a:xfrm>
+              <a:prstGeom prst="triangle">
+                <a:avLst/>
+              </a:prstGeom>
+              <a:solidFill>
+                <a:schemeClr val="bg1"/>
+              </a:solidFill>
+              <a:ln>
+                <a:solidFill>
+                  <a:schemeClr val="tx1"/>
+                </a:solidFill>
+              </a:ln>
+              <a:effectLst/>
+            </p:spPr>
+            <p:style>
+              <a:lnRef idx="1">
+                <a:schemeClr val="accent1"/>
+              </a:lnRef>
+              <a:fillRef idx="3">
+                <a:schemeClr val="accent1"/>
+              </a:fillRef>
+              <a:effectRef idx="2">
+                <a:schemeClr val="accent1"/>
+              </a:effectRef>
+              <a:fontRef idx="minor">
+                <a:schemeClr val="lt1"/>
+              </a:fontRef>
+            </p:style>
+            <p:txBody>
+              <a:bodyPr rtlCol="0" anchor="ctr"/>
+              <a:lstStyle/>
+              <a:p>
+                <a:pPr algn="ctr"/>
+                <a:endParaRPr lang="en-US"/>
+              </a:p>
+            </p:txBody>
+          </p:sp>
+          <p:sp>
+            <p:nvSpPr>
+              <p:cNvPr id="81" name="Oval 80"/>
+              <p:cNvSpPr/>
+              <p:nvPr/>
+            </p:nvSpPr>
+            <p:spPr>
+              <a:xfrm>
+                <a:off x="5275434" y="4616617"/>
+                <a:ext cx="278507" cy="278507"/>
+              </a:xfrm>
+              <a:prstGeom prst="ellipse">
+                <a:avLst/>
+              </a:prstGeom>
+              <a:noFill/>
+              <a:ln>
+                <a:solidFill>
+                  <a:schemeClr val="tx1"/>
+                </a:solidFill>
+              </a:ln>
+            </p:spPr>
+            <p:style>
+              <a:lnRef idx="1">
+                <a:schemeClr val="accent1"/>
+              </a:lnRef>
+              <a:fillRef idx="3">
+                <a:schemeClr val="accent1"/>
+              </a:fillRef>
+              <a:effectRef idx="2">
+                <a:schemeClr val="accent1"/>
+              </a:effectRef>
+              <a:fontRef idx="minor">
+                <a:schemeClr val="lt1"/>
+              </a:fontRef>
+            </p:style>
+            <p:txBody>
+              <a:bodyPr rtlCol="0" anchor="ctr"/>
+              <a:lstStyle/>
+              <a:p>
+                <a:pPr algn="ctr"/>
+                <a:endParaRPr lang="en-US"/>
+              </a:p>
+            </p:txBody>
+          </p:sp>
+          <p:cxnSp>
+            <p:nvCxnSpPr>
+              <p:cNvPr id="82" name="Straight Arrow Connector 81"/>
+              <p:cNvCxnSpPr>
+                <a:endCxn id="81" idx="2"/>
+              </p:cNvCxnSpPr>
+              <p:nvPr/>
+            </p:nvCxnSpPr>
+            <p:spPr>
+              <a:xfrm>
+                <a:off x="4999322" y="4755870"/>
+                <a:ext cx="276112" cy="1"/>
+              </a:xfrm>
+              <a:prstGeom prst="straightConnector1">
+                <a:avLst/>
+              </a:prstGeom>
+              <a:ln w="12700">
+                <a:solidFill>
+                  <a:schemeClr val="tx1"/>
+                </a:solidFill>
+                <a:tailEnd type="triangle"/>
+              </a:ln>
+              <a:effectLst/>
+            </p:spPr>
+            <p:style>
+              <a:lnRef idx="2">
+                <a:schemeClr val="accent1"/>
+              </a:lnRef>
+              <a:fillRef idx="0">
+                <a:schemeClr val="accent1"/>
+              </a:fillRef>
+              <a:effectRef idx="1">
+                <a:schemeClr val="accent1"/>
+              </a:effectRef>
+              <a:fontRef idx="minor">
+                <a:schemeClr val="tx1"/>
+              </a:fontRef>
+            </p:style>
+          </p:cxnSp>
+          <p:cxnSp>
+            <p:nvCxnSpPr>
+              <p:cNvPr id="83" name="Straight Arrow Connector 82"/>
+              <p:cNvCxnSpPr/>
+              <p:nvPr/>
+            </p:nvCxnSpPr>
+            <p:spPr>
+              <a:xfrm>
+                <a:off x="5553941" y="4755869"/>
+                <a:ext cx="276112" cy="1"/>
+              </a:xfrm>
+              <a:prstGeom prst="straightConnector1">
+                <a:avLst/>
+              </a:prstGeom>
+              <a:ln w="12700">
+                <a:solidFill>
+                  <a:schemeClr val="tx1"/>
+                </a:solidFill>
+                <a:tailEnd type="triangle"/>
+              </a:ln>
+              <a:effectLst/>
+            </p:spPr>
+            <p:style>
+              <a:lnRef idx="2">
+                <a:schemeClr val="accent1"/>
+              </a:lnRef>
+              <a:fillRef idx="0">
+                <a:schemeClr val="accent1"/>
+              </a:fillRef>
+              <a:effectRef idx="1">
+                <a:schemeClr val="accent1"/>
+              </a:effectRef>
+              <a:fontRef idx="minor">
+                <a:schemeClr val="tx1"/>
+              </a:fontRef>
+            </p:style>
+          </p:cxnSp>
+          <p:cxnSp>
+            <p:nvCxnSpPr>
+              <p:cNvPr id="84" name="Straight Arrow Connector 83"/>
+              <p:cNvCxnSpPr>
+                <a:stCxn id="80" idx="0"/>
+              </p:cNvCxnSpPr>
+              <p:nvPr/>
+            </p:nvCxnSpPr>
+            <p:spPr>
+              <a:xfrm rot="5400000">
+                <a:off x="5230154" y="4422455"/>
+                <a:ext cx="366760" cy="2307"/>
+              </a:xfrm>
+              <a:prstGeom prst="straightConnector1">
+                <a:avLst/>
+              </a:prstGeom>
+              <a:ln w="12700">
+                <a:solidFill>
+                  <a:schemeClr val="tx1"/>
+                </a:solidFill>
+                <a:tailEnd type="triangle"/>
+              </a:ln>
+              <a:effectLst/>
+            </p:spPr>
+            <p:style>
+              <a:lnRef idx="2">
+                <a:schemeClr val="accent1"/>
+              </a:lnRef>
+              <a:fillRef idx="0">
+                <a:schemeClr val="accent1"/>
+              </a:fillRef>
+              <a:effectRef idx="1">
+                <a:schemeClr val="accent1"/>
+              </a:effectRef>
+              <a:fontRef idx="minor">
+                <a:schemeClr val="tx1"/>
+              </a:fontRef>
+            </p:style>
+          </p:cxnSp>
+          <p:sp>
+            <p:nvSpPr>
+              <p:cNvPr id="85" name="Isosceles Triangle 84"/>
+              <p:cNvSpPr/>
+              <p:nvPr/>
+            </p:nvSpPr>
+            <p:spPr>
+              <a:xfrm>
+                <a:off x="5132808" y="5294652"/>
+                <a:ext cx="559144" cy="468322"/>
+              </a:xfrm>
+              <a:prstGeom prst="triangle">
+                <a:avLst/>
+              </a:prstGeom>
+              <a:solidFill>
+                <a:schemeClr val="bg1"/>
+              </a:solidFill>
+              <a:ln>
+                <a:solidFill>
+                  <a:schemeClr val="tx1"/>
+                </a:solidFill>
+              </a:ln>
+              <a:effectLst/>
+            </p:spPr>
+            <p:style>
+              <a:lnRef idx="1">
+                <a:schemeClr val="accent1"/>
+              </a:lnRef>
+              <a:fillRef idx="3">
+                <a:schemeClr val="accent1"/>
+              </a:fillRef>
+              <a:effectRef idx="2">
+                <a:schemeClr val="accent1"/>
+              </a:effectRef>
+              <a:fontRef idx="minor">
+                <a:schemeClr val="lt1"/>
+              </a:fontRef>
+            </p:style>
+            <p:txBody>
+              <a:bodyPr rtlCol="0" anchor="ctr"/>
+              <a:lstStyle/>
+              <a:p>
+                <a:pPr algn="ctr"/>
+                <a:endParaRPr lang="en-US"/>
+              </a:p>
+            </p:txBody>
+          </p:sp>
+          <p:cxnSp>
+            <p:nvCxnSpPr>
+              <p:cNvPr id="86" name="Straight Arrow Connector 85"/>
+              <p:cNvCxnSpPr>
+                <a:stCxn id="85" idx="0"/>
+              </p:cNvCxnSpPr>
+              <p:nvPr/>
+            </p:nvCxnSpPr>
+            <p:spPr>
+              <a:xfrm rot="5400000" flipH="1" flipV="1">
+                <a:off x="5213770" y="5093734"/>
+                <a:ext cx="399528" cy="2308"/>
+              </a:xfrm>
+              <a:prstGeom prst="straightConnector1">
+                <a:avLst/>
+              </a:prstGeom>
+              <a:ln w="12700">
+                <a:solidFill>
+                  <a:schemeClr val="tx1"/>
+                </a:solidFill>
+                <a:tailEnd type="triangle"/>
+              </a:ln>
+              <a:effectLst/>
+            </p:spPr>
+            <p:style>
+              <a:lnRef idx="2">
+                <a:schemeClr val="accent1"/>
+              </a:lnRef>
+              <a:fillRef idx="0">
+                <a:schemeClr val="accent1"/>
+              </a:fillRef>
+              <a:effectRef idx="1">
+                <a:schemeClr val="accent1"/>
+              </a:effectRef>
+              <a:fontRef idx="minor">
+                <a:schemeClr val="tx1"/>
+              </a:fontRef>
+            </p:style>
+          </p:cxnSp>
+        </p:grpSp>
+        <p:sp>
+          <p:nvSpPr>
+            <p:cNvPr id="88" name="TextBox 87"/>
+            <p:cNvSpPr txBox="1"/>
+            <p:nvPr/>
+          </p:nvSpPr>
+          <p:spPr>
+            <a:xfrm rot="16200000">
+              <a:off x="5217455" y="5454027"/>
+              <a:ext cx="389850" cy="276999"/>
+            </a:xfrm>
+            <a:prstGeom prst="rect">
+              <a:avLst/>
+            </a:prstGeom>
+            <a:noFill/>
+          </p:spPr>
+          <p:txBody>
+            <a:bodyPr wrap="none" rtlCol="0">
+              <a:spAutoFit/>
+            </a:bodyPr>
+            <a:lstStyle/>
+            <a:p>
+              <a:r>
+                <a:rPr lang="en-US" sz="1200" dirty="0" smtClean="0">
+                  <a:latin typeface="Times New Roman"/>
+                  <a:cs typeface="Times New Roman"/>
+                </a:rPr>
+                <a:t>-44</a:t>
+              </a:r>
+              <a:endParaRPr lang="en-US" sz="1200" dirty="0">
+                <a:latin typeface="Times New Roman"/>
+                <a:cs typeface="Times New Roman"/>
+              </a:endParaRPr>
+            </a:p>
+          </p:txBody>
+        </p:sp>
+        <p:sp>
+          <p:nvSpPr>
+            <p:cNvPr id="89" name="TextBox 88"/>
+            <p:cNvSpPr txBox="1"/>
+            <p:nvPr/>
+          </p:nvSpPr>
+          <p:spPr>
+            <a:xfrm rot="16200000">
+              <a:off x="6668877" y="5467927"/>
+              <a:ext cx="389800" cy="276999"/>
+            </a:xfrm>
+            <a:prstGeom prst="rect">
+              <a:avLst/>
+            </a:prstGeom>
+            <a:noFill/>
+          </p:spPr>
+          <p:txBody>
+            <a:bodyPr wrap="none" rtlCol="0">
+              <a:spAutoFit/>
+            </a:bodyPr>
+            <a:lstStyle/>
+            <a:p>
+              <a:r>
+                <a:rPr lang="en-US" sz="1200" dirty="0" smtClean="0">
+                  <a:latin typeface="Times New Roman"/>
+                  <a:cs typeface="Times New Roman"/>
+                </a:rPr>
+                <a:t>-15</a:t>
+              </a:r>
+              <a:endParaRPr lang="en-US" sz="1200" dirty="0">
+                <a:latin typeface="Times New Roman"/>
+                <a:cs typeface="Times New Roman"/>
+              </a:endParaRPr>
+            </a:p>
+          </p:txBody>
+        </p:sp>
+        <p:sp>
+          <p:nvSpPr>
+            <p:cNvPr id="90" name="TextBox 89"/>
+            <p:cNvSpPr txBox="1"/>
+            <p:nvPr/>
+          </p:nvSpPr>
+          <p:spPr>
+            <a:xfrm rot="5400000">
+              <a:off x="5217455" y="3758426"/>
+              <a:ext cx="415498" cy="276999"/>
+            </a:xfrm>
+            <a:prstGeom prst="rect">
+              <a:avLst/>
+            </a:prstGeom>
+            <a:noFill/>
+          </p:spPr>
+          <p:txBody>
+            <a:bodyPr wrap="none" rtlCol="0">
+              <a:spAutoFit/>
+            </a:bodyPr>
+            <a:lstStyle/>
+            <a:p>
+              <a:r>
+                <a:rPr lang="en-US" sz="1200" dirty="0" smtClean="0">
+                  <a:latin typeface="Times New Roman"/>
+                  <a:cs typeface="Times New Roman"/>
+                </a:rPr>
+                <a:t>356</a:t>
+              </a:r>
+              <a:endParaRPr lang="en-US" sz="1200" dirty="0">
+                <a:latin typeface="Times New Roman"/>
+                <a:cs typeface="Times New Roman"/>
+              </a:endParaRPr>
+            </a:p>
+          </p:txBody>
+        </p:sp>
+        <p:sp>
+          <p:nvSpPr>
+            <p:cNvPr id="91" name="TextBox 90"/>
+            <p:cNvSpPr txBox="1"/>
+            <p:nvPr/>
+          </p:nvSpPr>
+          <p:spPr>
+            <a:xfrm rot="5400000">
+              <a:off x="6691107" y="3772326"/>
+              <a:ext cx="338554" cy="276999"/>
+            </a:xfrm>
+            <a:prstGeom prst="rect">
+              <a:avLst/>
+            </a:prstGeom>
+            <a:noFill/>
+          </p:spPr>
+          <p:txBody>
+            <a:bodyPr wrap="none" rtlCol="0">
+              <a:spAutoFit/>
+            </a:bodyPr>
+            <a:lstStyle/>
+            <a:p>
+              <a:r>
+                <a:rPr lang="en-US" sz="1200" dirty="0" smtClean="0">
+                  <a:latin typeface="Times New Roman"/>
+                  <a:cs typeface="Times New Roman"/>
+                </a:rPr>
+                <a:t>25</a:t>
+              </a:r>
+              <a:endParaRPr lang="en-US" sz="1200" dirty="0">
+                <a:latin typeface="Times New Roman"/>
+                <a:cs typeface="Times New Roman"/>
+              </a:endParaRPr>
+            </a:p>
+          </p:txBody>
+        </p:sp>
+        <p:sp>
+          <p:nvSpPr>
+            <p:cNvPr id="92" name="Isosceles Triangle 91"/>
+            <p:cNvSpPr/>
+            <p:nvPr/>
+          </p:nvSpPr>
+          <p:spPr>
+            <a:xfrm rot="5400000">
+              <a:off x="4485589" y="4509815"/>
+              <a:ext cx="559144" cy="468322"/>
+            </a:xfrm>
+            <a:prstGeom prst="triangle">
+              <a:avLst/>
+            </a:prstGeom>
+            <a:solidFill>
+              <a:schemeClr val="bg1"/>
+            </a:solidFill>
+            <a:ln>
+              <a:solidFill>
+                <a:schemeClr val="tx1"/>
+              </a:solidFill>
+            </a:ln>
+            <a:effectLst/>
+          </p:spPr>
+          <p:style>
+            <a:lnRef idx="1">
+              <a:schemeClr val="accent1"/>
+            </a:lnRef>
+            <a:fillRef idx="3">
+              <a:schemeClr val="accent1"/>
+            </a:fillRef>
+            <a:effectRef idx="2">
+              <a:schemeClr val="accent1"/>
+            </a:effectRef>
+            <a:fontRef idx="minor">
+              <a:schemeClr val="lt1"/>
+            </a:fontRef>
+          </p:style>
+          <p:txBody>
+            <a:bodyPr rtlCol="0" anchor="ctr"/>
+            <a:lstStyle/>
+            <a:p>
+              <a:pPr algn="ctr"/>
+              <a:endParaRPr lang="en-US"/>
+            </a:p>
+          </p:txBody>
+        </p:sp>
+        <p:sp>
+          <p:nvSpPr>
+            <p:cNvPr id="93" name="TextBox 92"/>
+            <p:cNvSpPr txBox="1"/>
+            <p:nvPr/>
+          </p:nvSpPr>
+          <p:spPr>
+            <a:xfrm>
+              <a:off x="4561805" y="4581515"/>
+              <a:ext cx="261610" cy="276999"/>
+            </a:xfrm>
+            <a:prstGeom prst="rect">
+              <a:avLst/>
+            </a:prstGeom>
+            <a:noFill/>
+          </p:spPr>
+          <p:txBody>
+            <a:bodyPr wrap="none" rtlCol="0">
+              <a:spAutoFit/>
+            </a:bodyPr>
+            <a:lstStyle/>
+            <a:p>
+              <a:r>
+                <a:rPr lang="en-US" sz="1200" dirty="0" smtClean="0">
+                  <a:latin typeface="Times New Roman"/>
+                  <a:cs typeface="Times New Roman"/>
+                </a:rPr>
+                <a:t>7</a:t>
+              </a:r>
+              <a:endParaRPr lang="en-US" sz="1200" dirty="0">
+                <a:latin typeface="Times New Roman"/>
+                <a:cs typeface="Times New Roman"/>
+              </a:endParaRPr>
+            </a:p>
+          </p:txBody>
+        </p:sp>
+        <p:cxnSp>
+          <p:nvCxnSpPr>
+            <p:cNvPr id="94" name="Straight Arrow Connector 93"/>
+            <p:cNvCxnSpPr/>
+            <p:nvPr/>
+          </p:nvCxnSpPr>
+          <p:spPr>
+            <a:xfrm flipV="1">
+              <a:off x="4151647" y="4742388"/>
+              <a:ext cx="379353" cy="2383"/>
+            </a:xfrm>
+            <a:prstGeom prst="straightConnector1">
+              <a:avLst/>
+            </a:prstGeom>
+            <a:ln w="12700">
+              <a:solidFill>
+                <a:schemeClr val="tx1"/>
+              </a:solidFill>
+              <a:tailEnd type="triangle"/>
+            </a:ln>
+            <a:effectLst/>
+          </p:spPr>
+          <p:style>
+            <a:lnRef idx="2">
+              <a:schemeClr val="accent1"/>
+            </a:lnRef>
+            <a:fillRef idx="0">
+              <a:schemeClr val="accent1"/>
+            </a:fillRef>
+            <a:effectRef idx="1">
+              <a:schemeClr val="accent1"/>
+            </a:effectRef>
+            <a:fontRef idx="minor">
+              <a:schemeClr val="tx1"/>
+            </a:fontRef>
+          </p:style>
+        </p:cxnSp>
+        <p:sp>
+          <p:nvSpPr>
+            <p:cNvPr id="96" name="TextBox 95"/>
+            <p:cNvSpPr txBox="1"/>
+            <p:nvPr/>
+          </p:nvSpPr>
+          <p:spPr>
+            <a:xfrm>
+              <a:off x="3964689" y="4565541"/>
+              <a:ext cx="272831" cy="276999"/>
+            </a:xfrm>
+            <a:prstGeom prst="rect">
+              <a:avLst/>
+            </a:prstGeom>
+            <a:noFill/>
+          </p:spPr>
+          <p:txBody>
+            <a:bodyPr wrap="none" rtlCol="0">
+              <a:spAutoFit/>
+            </a:bodyPr>
+            <a:lstStyle/>
+            <a:p>
+              <a:r>
+                <a:rPr lang="en-US" sz="1200" i="1" dirty="0" err="1" smtClean="0">
+                  <a:latin typeface="Times New Roman"/>
+                </a:rPr>
+                <a:t>u</a:t>
+              </a:r>
+              <a:endParaRPr lang="en-US" sz="1200" dirty="0">
+                <a:latin typeface="Times New Roman"/>
+              </a:endParaRPr>
+            </a:p>
+          </p:txBody>
+        </p:sp>
+        <p:graphicFrame>
+          <p:nvGraphicFramePr>
+            <p:cNvPr id="97" name="Object 96"/>
+            <p:cNvGraphicFramePr>
+              <a:graphicFrameLocks noChangeAspect="1"/>
+            </p:cNvGraphicFramePr>
+            <p:nvPr/>
+          </p:nvGraphicFramePr>
+          <p:xfrm>
+            <a:off x="8401808" y="4487863"/>
+            <a:ext cx="406400" cy="203200"/>
+          </p:xfrm>
+          <a:graphic>
+            <a:graphicData uri="http://schemas.openxmlformats.org/presentationml/2006/ole">
+              <p:oleObj spid="_x0000_s62481" name="Equation" r:id="rId10" imgW="406400" imgH="203200" progId="Equation.DSMT4">
+                <p:embed/>
+              </p:oleObj>
+            </a:graphicData>
+          </a:graphic>
+        </p:graphicFrame>
+        <p:graphicFrame>
+          <p:nvGraphicFramePr>
+            <p:cNvPr id="98" name="Object 97"/>
+            <p:cNvGraphicFramePr>
+              <a:graphicFrameLocks noChangeAspect="1"/>
+            </p:cNvGraphicFramePr>
+            <p:nvPr/>
+          </p:nvGraphicFramePr>
+          <p:xfrm>
+            <a:off x="6492875" y="4492625"/>
+            <a:ext cx="177800" cy="203200"/>
+          </p:xfrm>
+          <a:graphic>
+            <a:graphicData uri="http://schemas.openxmlformats.org/presentationml/2006/ole">
+              <p:oleObj spid="_x0000_s62482" name="Equation" r:id="rId11" imgW="177800" imgH="203200" progId="Equation.DSMT4">
+                <p:embed/>
+              </p:oleObj>
+            </a:graphicData>
+          </a:graphic>
+        </p:graphicFrame>
+        <p:sp>
+          <p:nvSpPr>
+            <p:cNvPr id="99" name="TextBox 98"/>
+            <p:cNvSpPr txBox="1"/>
+            <p:nvPr/>
+          </p:nvSpPr>
+          <p:spPr>
+            <a:xfrm>
+              <a:off x="6868939" y="4402047"/>
+              <a:ext cx="274434" cy="276999"/>
+            </a:xfrm>
+            <a:prstGeom prst="rect">
+              <a:avLst/>
+            </a:prstGeom>
+            <a:noFill/>
+          </p:spPr>
+          <p:txBody>
+            <a:bodyPr wrap="square" rtlCol="0">
+              <a:spAutoFit/>
+            </a:bodyPr>
+            <a:lstStyle/>
+            <a:p>
+              <a:r>
+                <a:rPr lang="en-US" sz="1200" dirty="0" smtClean="0">
+                  <a:latin typeface="Symbol"/>
+                </a:rPr>
+                <a:t>+</a:t>
+              </a:r>
+              <a:endParaRPr lang="en-US" sz="1200" dirty="0">
+                <a:latin typeface="Symbol"/>
+              </a:endParaRPr>
+            </a:p>
+          </p:txBody>
+        </p:sp>
+        <p:sp>
+          <p:nvSpPr>
+            <p:cNvPr id="100" name="TextBox 99"/>
+            <p:cNvSpPr txBox="1"/>
+            <p:nvPr/>
+          </p:nvSpPr>
+          <p:spPr>
+            <a:xfrm>
+              <a:off x="6868939" y="4786392"/>
+              <a:ext cx="274434" cy="276999"/>
+            </a:xfrm>
+            <a:prstGeom prst="rect">
+              <a:avLst/>
+            </a:prstGeom>
+            <a:noFill/>
+          </p:spPr>
+          <p:txBody>
+            <a:bodyPr wrap="square" rtlCol="0">
+              <a:spAutoFit/>
+            </a:bodyPr>
+            <a:lstStyle/>
+            <a:p>
+              <a:r>
+                <a:rPr lang="en-US" sz="1200" dirty="0" smtClean="0">
+                  <a:latin typeface="Symbol"/>
+                </a:rPr>
+                <a:t>+</a:t>
+              </a:r>
+              <a:endParaRPr lang="en-US" sz="1200" dirty="0">
+                <a:latin typeface="Symbol"/>
+              </a:endParaRPr>
+            </a:p>
+          </p:txBody>
+        </p:sp>
+        <p:sp>
+          <p:nvSpPr>
+            <p:cNvPr id="101" name="TextBox 100"/>
+            <p:cNvSpPr txBox="1"/>
+            <p:nvPr/>
+          </p:nvSpPr>
+          <p:spPr>
+            <a:xfrm>
+              <a:off x="6572755" y="4792753"/>
+              <a:ext cx="274434" cy="276999"/>
+            </a:xfrm>
+            <a:prstGeom prst="rect">
+              <a:avLst/>
+            </a:prstGeom>
+            <a:noFill/>
+          </p:spPr>
+          <p:txBody>
+            <a:bodyPr wrap="square" rtlCol="0">
+              <a:spAutoFit/>
+            </a:bodyPr>
+            <a:lstStyle/>
+            <a:p>
+              <a:r>
+                <a:rPr lang="en-US" sz="1200" dirty="0" smtClean="0">
+                  <a:latin typeface="Symbol"/>
+                </a:rPr>
+                <a:t>+</a:t>
+              </a:r>
+              <a:endParaRPr lang="en-US" sz="1200" dirty="0">
+                <a:latin typeface="Symbol"/>
+              </a:endParaRPr>
+            </a:p>
+          </p:txBody>
+        </p:sp>
+        <p:cxnSp>
+          <p:nvCxnSpPr>
+            <p:cNvPr id="103" name="Shape 102"/>
+            <p:cNvCxnSpPr>
+              <a:endCxn id="88" idx="1"/>
+            </p:cNvCxnSpPr>
+            <p:nvPr/>
+          </p:nvCxnSpPr>
+          <p:spPr>
+            <a:xfrm rot="10800000" flipV="1">
+              <a:off x="5412381" y="4742388"/>
+              <a:ext cx="2932872" cy="1045064"/>
+            </a:xfrm>
+            <a:prstGeom prst="bentConnector4">
+              <a:avLst>
+                <a:gd name="adj1" fmla="val -168"/>
+                <a:gd name="adj2" fmla="val 134818"/>
+              </a:avLst>
+            </a:prstGeom>
+            <a:ln w="12700">
+              <a:solidFill>
+                <a:schemeClr val="tx1"/>
+              </a:solidFill>
+              <a:tailEnd type="triangle"/>
+            </a:ln>
+            <a:effectLst/>
+          </p:spPr>
+          <p:style>
+            <a:lnRef idx="2">
+              <a:schemeClr val="accent1"/>
+            </a:lnRef>
+            <a:fillRef idx="0">
+              <a:schemeClr val="accent1"/>
+            </a:fillRef>
+            <a:effectRef idx="1">
+              <a:schemeClr val="accent1"/>
+            </a:effectRef>
+            <a:fontRef idx="minor">
+              <a:schemeClr val="tx1"/>
+            </a:fontRef>
+          </p:style>
+        </p:cxnSp>
+        <p:sp>
+          <p:nvSpPr>
+            <p:cNvPr id="116" name="Oval 115"/>
+            <p:cNvSpPr/>
+            <p:nvPr/>
+          </p:nvSpPr>
+          <p:spPr>
+            <a:xfrm>
+              <a:off x="8213987" y="3295314"/>
+              <a:ext cx="278507" cy="278507"/>
+            </a:xfrm>
+            <a:prstGeom prst="ellipse">
+              <a:avLst/>
+            </a:prstGeom>
+            <a:noFill/>
+            <a:ln>
+              <a:solidFill>
+                <a:schemeClr val="tx1"/>
+              </a:solidFill>
+            </a:ln>
+          </p:spPr>
+          <p:style>
+            <a:lnRef idx="1">
+              <a:schemeClr val="accent1"/>
+            </a:lnRef>
+            <a:fillRef idx="3">
+              <a:schemeClr val="accent1"/>
+            </a:fillRef>
+            <a:effectRef idx="2">
+              <a:schemeClr val="accent1"/>
+            </a:effectRef>
+            <a:fontRef idx="minor">
+              <a:schemeClr val="lt1"/>
+            </a:fontRef>
+          </p:style>
+          <p:txBody>
+            <a:bodyPr rtlCol="0" anchor="ctr"/>
+            <a:lstStyle/>
+            <a:p>
+              <a:pPr algn="ctr"/>
+              <a:endParaRPr lang="en-US"/>
+            </a:p>
+          </p:txBody>
+        </p:sp>
+        <p:cxnSp>
+          <p:nvCxnSpPr>
+            <p:cNvPr id="118" name="Straight Arrow Connector 117"/>
+            <p:cNvCxnSpPr/>
+            <p:nvPr/>
+          </p:nvCxnSpPr>
+          <p:spPr>
+            <a:xfrm rot="5400000" flipH="1" flipV="1">
+              <a:off x="7767370" y="4158899"/>
+              <a:ext cx="1170949" cy="794"/>
+            </a:xfrm>
+            <a:prstGeom prst="straightConnector1">
+              <a:avLst/>
+            </a:prstGeom>
+            <a:ln w="12700">
+              <a:solidFill>
+                <a:schemeClr val="tx1"/>
+              </a:solidFill>
+              <a:tailEnd type="triangle"/>
+            </a:ln>
+            <a:effectLst/>
+          </p:spPr>
+          <p:style>
+            <a:lnRef idx="2">
+              <a:schemeClr val="accent1"/>
+            </a:lnRef>
+            <a:fillRef idx="0">
+              <a:schemeClr val="accent1"/>
+            </a:fillRef>
+            <a:effectRef idx="1">
+              <a:schemeClr val="accent1"/>
+            </a:effectRef>
+            <a:fontRef idx="minor">
+              <a:schemeClr val="tx1"/>
+            </a:fontRef>
+          </p:style>
+        </p:cxnSp>
+        <p:cxnSp>
+          <p:nvCxnSpPr>
+            <p:cNvPr id="121" name="Shape 120"/>
+            <p:cNvCxnSpPr>
+              <a:endCxn id="90" idx="1"/>
+            </p:cNvCxnSpPr>
+            <p:nvPr/>
+          </p:nvCxnSpPr>
+          <p:spPr>
+            <a:xfrm rot="10800000" flipV="1">
+              <a:off x="5425204" y="3428999"/>
+              <a:ext cx="2778266" cy="260177"/>
+            </a:xfrm>
+            <a:prstGeom prst="bentConnector2">
+              <a:avLst/>
+            </a:prstGeom>
+            <a:ln w="12700">
+              <a:solidFill>
+                <a:schemeClr val="tx1"/>
+              </a:solidFill>
+              <a:tailEnd type="triangle"/>
+            </a:ln>
+            <a:effectLst/>
+          </p:spPr>
+          <p:style>
+            <a:lnRef idx="2">
+              <a:schemeClr val="accent1"/>
+            </a:lnRef>
+            <a:fillRef idx="0">
+              <a:schemeClr val="accent1"/>
+            </a:fillRef>
+            <a:effectRef idx="1">
+              <a:schemeClr val="accent1"/>
+            </a:effectRef>
+            <a:fontRef idx="minor">
+              <a:schemeClr val="tx1"/>
+            </a:fontRef>
+          </p:style>
+        </p:cxnSp>
+        <p:cxnSp>
+          <p:nvCxnSpPr>
+            <p:cNvPr id="124" name="Straight Arrow Connector 123"/>
+            <p:cNvCxnSpPr/>
+            <p:nvPr/>
+          </p:nvCxnSpPr>
+          <p:spPr>
+            <a:xfrm rot="5400000">
+              <a:off x="8173320" y="3110781"/>
+              <a:ext cx="366761" cy="2306"/>
+            </a:xfrm>
+            <a:prstGeom prst="straightConnector1">
+              <a:avLst/>
+            </a:prstGeom>
+            <a:ln w="12700">
+              <a:solidFill>
+                <a:schemeClr val="tx1"/>
+              </a:solidFill>
+              <a:tailEnd type="triangle"/>
+            </a:ln>
+            <a:effectLst/>
+          </p:spPr>
+          <p:style>
+            <a:lnRef idx="2">
+              <a:schemeClr val="accent1"/>
+            </a:lnRef>
+            <a:fillRef idx="0">
+              <a:schemeClr val="accent1"/>
+            </a:fillRef>
+            <a:effectRef idx="1">
+              <a:schemeClr val="accent1"/>
+            </a:effectRef>
+            <a:fontRef idx="minor">
+              <a:schemeClr val="tx1"/>
+            </a:fontRef>
+          </p:style>
+        </p:cxnSp>
+        <p:sp>
+          <p:nvSpPr>
+            <p:cNvPr id="125" name="TextBox 124"/>
+            <p:cNvSpPr txBox="1"/>
+            <p:nvPr/>
+          </p:nvSpPr>
+          <p:spPr>
+            <a:xfrm>
+              <a:off x="5034299" y="4678861"/>
+              <a:ext cx="274434" cy="276999"/>
+            </a:xfrm>
+            <a:prstGeom prst="rect">
+              <a:avLst/>
+            </a:prstGeom>
+            <a:noFill/>
+          </p:spPr>
+          <p:txBody>
+            <a:bodyPr wrap="square" rtlCol="0">
+              <a:spAutoFit/>
+            </a:bodyPr>
+            <a:lstStyle/>
+            <a:p>
+              <a:r>
+                <a:rPr lang="en-US" sz="1200" dirty="0" smtClean="0">
+                  <a:latin typeface="Symbol"/>
+                </a:rPr>
+                <a:t>+</a:t>
+              </a:r>
+              <a:endParaRPr lang="en-US" sz="1200" dirty="0">
+                <a:latin typeface="Symbol"/>
+              </a:endParaRPr>
+            </a:p>
+          </p:txBody>
+        </p:sp>
+        <p:sp>
+          <p:nvSpPr>
+            <p:cNvPr id="126" name="TextBox 125"/>
+            <p:cNvSpPr txBox="1"/>
+            <p:nvPr/>
+          </p:nvSpPr>
+          <p:spPr>
+            <a:xfrm>
+              <a:off x="5180736" y="4328477"/>
+              <a:ext cx="274434" cy="276999"/>
+            </a:xfrm>
+            <a:prstGeom prst="rect">
+              <a:avLst/>
+            </a:prstGeom>
+            <a:noFill/>
+          </p:spPr>
+          <p:txBody>
+            <a:bodyPr wrap="square" rtlCol="0">
+              <a:spAutoFit/>
+            </a:bodyPr>
+            <a:lstStyle/>
+            <a:p>
+              <a:r>
+                <a:rPr lang="en-US" sz="1200" dirty="0" smtClean="0">
+                  <a:latin typeface="Symbol"/>
+                </a:rPr>
+                <a:t>+</a:t>
+              </a:r>
+              <a:endParaRPr lang="en-US" sz="1200" dirty="0">
+                <a:latin typeface="Symbol"/>
+              </a:endParaRPr>
+            </a:p>
+          </p:txBody>
+        </p:sp>
+        <p:sp>
+          <p:nvSpPr>
+            <p:cNvPr id="127" name="TextBox 126"/>
+            <p:cNvSpPr txBox="1"/>
+            <p:nvPr/>
+          </p:nvSpPr>
+          <p:spPr>
+            <a:xfrm>
+              <a:off x="5368796" y="4829259"/>
+              <a:ext cx="274434" cy="276999"/>
+            </a:xfrm>
+            <a:prstGeom prst="rect">
+              <a:avLst/>
+            </a:prstGeom>
+            <a:noFill/>
+          </p:spPr>
+          <p:txBody>
+            <a:bodyPr wrap="square" rtlCol="0">
+              <a:spAutoFit/>
+            </a:bodyPr>
+            <a:lstStyle/>
+            <a:p>
+              <a:r>
+                <a:rPr lang="en-US" sz="1200" dirty="0" smtClean="0">
+                  <a:latin typeface="Symbol"/>
+                </a:rPr>
+                <a:t>+</a:t>
+              </a:r>
+              <a:endParaRPr lang="en-US" sz="1200" dirty="0">
+                <a:latin typeface="Symbol"/>
+              </a:endParaRPr>
+            </a:p>
+          </p:txBody>
+        </p:sp>
+        <p:sp>
+          <p:nvSpPr>
+            <p:cNvPr id="128" name="TextBox 127"/>
+            <p:cNvSpPr txBox="1"/>
+            <p:nvPr/>
+          </p:nvSpPr>
+          <p:spPr>
+            <a:xfrm>
+              <a:off x="8066253" y="3011958"/>
+              <a:ext cx="274434" cy="276999"/>
+            </a:xfrm>
+            <a:prstGeom prst="rect">
+              <a:avLst/>
+            </a:prstGeom>
+            <a:noFill/>
+          </p:spPr>
+          <p:txBody>
+            <a:bodyPr wrap="square" rtlCol="0">
+              <a:spAutoFit/>
+            </a:bodyPr>
+            <a:lstStyle/>
+            <a:p>
+              <a:r>
+                <a:rPr lang="en-US" sz="1200" dirty="0" smtClean="0">
+                  <a:latin typeface="Symbol"/>
+                </a:rPr>
+                <a:t>+</a:t>
+              </a:r>
+              <a:endParaRPr lang="en-US" sz="1200" dirty="0">
+                <a:latin typeface="Symbol"/>
+              </a:endParaRPr>
+            </a:p>
+          </p:txBody>
+        </p:sp>
+        <p:sp>
+          <p:nvSpPr>
+            <p:cNvPr id="129" name="TextBox 128"/>
+            <p:cNvSpPr txBox="1"/>
+            <p:nvPr/>
+          </p:nvSpPr>
+          <p:spPr>
+            <a:xfrm>
+              <a:off x="8066253" y="3532186"/>
+              <a:ext cx="274434" cy="276999"/>
+            </a:xfrm>
+            <a:prstGeom prst="rect">
+              <a:avLst/>
+            </a:prstGeom>
+            <a:noFill/>
+          </p:spPr>
+          <p:txBody>
+            <a:bodyPr wrap="square" rtlCol="0">
+              <a:spAutoFit/>
+            </a:bodyPr>
+            <a:lstStyle/>
+            <a:p>
+              <a:r>
+                <a:rPr lang="en-US" sz="1200" dirty="0" smtClean="0">
+                  <a:latin typeface="Symbol"/>
+                </a:rPr>
+                <a:t>-</a:t>
+              </a:r>
+              <a:endParaRPr lang="en-US" sz="1200" dirty="0">
+                <a:latin typeface="Symbol"/>
+              </a:endParaRPr>
+            </a:p>
+          </p:txBody>
+        </p:sp>
+        <p:cxnSp>
+          <p:nvCxnSpPr>
+            <p:cNvPr id="130" name="Straight Arrow Connector 129"/>
+            <p:cNvCxnSpPr/>
+            <p:nvPr/>
+          </p:nvCxnSpPr>
+          <p:spPr>
+            <a:xfrm rot="5400000" flipH="1" flipV="1">
+              <a:off x="6670329" y="5958575"/>
+              <a:ext cx="399528" cy="2308"/>
+            </a:xfrm>
+            <a:prstGeom prst="straightConnector1">
+              <a:avLst/>
+            </a:prstGeom>
+            <a:ln w="12700">
+              <a:solidFill>
+                <a:schemeClr val="tx1"/>
+              </a:solidFill>
+              <a:tailEnd type="triangle"/>
+            </a:ln>
+            <a:effectLst/>
+          </p:spPr>
+          <p:style>
+            <a:lnRef idx="2">
+              <a:schemeClr val="accent1"/>
+            </a:lnRef>
+            <a:fillRef idx="0">
+              <a:schemeClr val="accent1"/>
+            </a:fillRef>
+            <a:effectRef idx="1">
+              <a:schemeClr val="accent1"/>
+            </a:effectRef>
+            <a:fontRef idx="minor">
+              <a:schemeClr val="tx1"/>
+            </a:fontRef>
+          </p:style>
+        </p:cxnSp>
+        <p:cxnSp>
+          <p:nvCxnSpPr>
+            <p:cNvPr id="131" name="Straight Arrow Connector 130"/>
+            <p:cNvCxnSpPr/>
+            <p:nvPr/>
+          </p:nvCxnSpPr>
+          <p:spPr>
+            <a:xfrm rot="5400000">
+              <a:off x="6709366" y="3590879"/>
+              <a:ext cx="323763" cy="1588"/>
+            </a:xfrm>
+            <a:prstGeom prst="straightConnector1">
+              <a:avLst/>
+            </a:prstGeom>
+            <a:ln w="12700">
+              <a:solidFill>
+                <a:schemeClr val="tx1"/>
+              </a:solidFill>
+              <a:tailEnd type="triangle"/>
+            </a:ln>
+            <a:effectLst/>
+          </p:spPr>
+          <p:style>
+            <a:lnRef idx="2">
+              <a:schemeClr val="accent1"/>
+            </a:lnRef>
+            <a:fillRef idx="0">
+              <a:schemeClr val="accent1"/>
+            </a:fillRef>
+            <a:effectRef idx="1">
+              <a:schemeClr val="accent1"/>
+            </a:effectRef>
+            <a:fontRef idx="minor">
+              <a:schemeClr val="tx1"/>
+            </a:fontRef>
+          </p:style>
+        </p:cxnSp>
+        <p:sp>
+          <p:nvSpPr>
+            <p:cNvPr id="134" name="TextBox 133"/>
+            <p:cNvSpPr txBox="1"/>
+            <p:nvPr/>
+          </p:nvSpPr>
+          <p:spPr>
+            <a:xfrm>
+              <a:off x="8237102" y="2614563"/>
+              <a:ext cx="278617" cy="276999"/>
+            </a:xfrm>
+            <a:prstGeom prst="rect">
+              <a:avLst/>
+            </a:prstGeom>
+            <a:noFill/>
+          </p:spPr>
+          <p:txBody>
+            <a:bodyPr wrap="none" rtlCol="0">
+              <a:spAutoFit/>
+            </a:bodyPr>
+            <a:lstStyle/>
+            <a:p>
+              <a:r>
+                <a:rPr lang="en-US" sz="1200" i="1" dirty="0" err="1" smtClean="0">
+                  <a:latin typeface="Times New Roman"/>
+                </a:rPr>
+                <a:t>y</a:t>
+              </a:r>
+              <a:endParaRPr lang="en-US" sz="1200" dirty="0">
+                <a:latin typeface="Times New Roman"/>
+              </a:endParaRPr>
+            </a:p>
+          </p:txBody>
+        </p:sp>
+      </p:grpSp>
     </p:spTree>
   </p:cSld>
   <p:clrMapOvr>

</xml_diff>

<commit_message>
Updated master pictures file
</commit_message>
<xml_diff>
--- a/DigitalSystems/Lecture12/pictures/pictures-converted.pptx
+++ b/DigitalSystems/Lecture12/pictures/pictures-converted.pptx
@@ -5,7 +5,7 @@
     <p:sldMasterId id="2147483648" r:id="rId1"/>
   </p:sldMasterIdLst>
   <p:notesMasterIdLst>
-    <p:notesMasterId r:id="rId23"/>
+    <p:notesMasterId r:id="rId24"/>
   </p:notesMasterIdLst>
   <p:sldIdLst>
     <p:sldId id="256" r:id="rId2"/>
@@ -29,6 +29,7 @@
     <p:sldId id="274" r:id="rId20"/>
     <p:sldId id="275" r:id="rId21"/>
     <p:sldId id="276" r:id="rId22"/>
+    <p:sldId id="277" r:id="rId23"/>
   </p:sldIdLst>
   <p:sldSz cx="9144000" cy="6858000" type="screen4x3"/>
   <p:notesSz cx="6858000" cy="9144000"/>
@@ -14479,15 +14480,59 @@
           </a:p>
         </p:txBody>
       </p:sp>
+    </p:spTree>
+  </p:cSld>
+  <p:clrMapOvr>
+    <a:masterClrMapping/>
+  </p:clrMapOvr>
+</p:sld>
+</file>
+
+<file path=ppt/slides/slide22.xml><?xml version="1.0" encoding="utf-8"?>
+<p:sld xmlns:a="http://schemas.openxmlformats.org/drawingml/2006/main" xmlns:r="http://schemas.openxmlformats.org/officeDocument/2006/relationships" xmlns:mc="http://schemas.openxmlformats.org/markup-compatibility/2006" xmlns:mv="urn:schemas-microsoft-com:mac:vml" xmlns:p="http://schemas.openxmlformats.org/presentationml/2006/main" mc:Ignorable="mv" mc:PreserveAttributes="mv:*">
+  <p:cSld>
+    <p:spTree>
+      <p:nvGrpSpPr>
+        <p:cNvPr id="1" name=""/>
+        <p:cNvGrpSpPr/>
+        <p:nvPr/>
+      </p:nvGrpSpPr>
+      <p:grpSpPr>
+        <a:xfrm>
+          <a:off x="0" y="0"/>
+          <a:ext cx="0" cy="0"/>
+          <a:chOff x="0" y="0"/>
+          <a:chExt cx="0" cy="0"/>
+        </a:xfrm>
+      </p:grpSpPr>
+      <p:sp>
+        <p:nvSpPr>
+          <p:cNvPr id="2" name="Title 1"/>
+          <p:cNvSpPr>
+            <a:spLocks noGrp="1"/>
+          </p:cNvSpPr>
+          <p:nvPr>
+            <p:ph type="title"/>
+          </p:nvPr>
+        </p:nvSpPr>
+        <p:spPr/>
+        <p:txBody>
+          <a:bodyPr/>
+          <a:lstStyle/>
+          <a:p>
+            <a:endParaRPr lang="en-US"/>
+          </a:p>
+        </p:txBody>
+      </p:sp>
       <p:grpSp>
         <p:nvGrpSpPr>
-          <p:cNvPr id="135" name="Group 134"/>
+          <p:cNvPr id="4" name="Group 3"/>
           <p:cNvGrpSpPr/>
           <p:nvPr/>
         </p:nvGrpSpPr>
         <p:grpSpPr>
           <a:xfrm>
-            <a:off x="3964689" y="2614563"/>
+            <a:off x="1912985" y="1953673"/>
             <a:ext cx="4853809" cy="3544930"/>
             <a:chOff x="3964689" y="2614563"/>
             <a:chExt cx="4853809" cy="3544930"/>
@@ -14495,7 +14540,7 @@
         </p:grpSpPr>
         <p:sp>
           <p:nvSpPr>
-            <p:cNvPr id="42" name="Rectangle 41"/>
+            <p:cNvPr id="5" name="Rectangle 4"/>
             <p:cNvSpPr/>
             <p:nvPr/>
           </p:nvSpPr>
@@ -14542,7 +14587,7 @@
         </p:sp>
         <p:graphicFrame>
           <p:nvGraphicFramePr>
-            <p:cNvPr id="45" name="Object 44"/>
+            <p:cNvPr id="6" name="Object 5"/>
             <p:cNvGraphicFramePr>
               <a:graphicFrameLocks noChangeAspect="1"/>
             </p:cNvGraphicFramePr>
@@ -14554,7 +14599,7 @@
           </p:xfrm>
           <a:graphic>
             <a:graphicData uri="http://schemas.openxmlformats.org/presentationml/2006/ole">
-              <p:oleObj spid="_x0000_s62479" name="Equation" r:id="rId8" imgW="139700" imgH="393700" progId="Equation.DSMT4">
+              <p:oleObj spid="_x0000_s78850" name="Equation" r:id="rId3" imgW="139700" imgH="393700" progId="Equation.DSMT4">
                 <p:embed/>
               </p:oleObj>
             </a:graphicData>
@@ -14562,7 +14607,7 @@
         </p:graphicFrame>
         <p:sp>
           <p:nvSpPr>
-            <p:cNvPr id="48" name="Rectangle 47"/>
+            <p:cNvPr id="7" name="Rectangle 6"/>
             <p:cNvSpPr/>
             <p:nvPr/>
           </p:nvSpPr>
@@ -14609,7 +14654,7 @@
         </p:sp>
         <p:graphicFrame>
           <p:nvGraphicFramePr>
-            <p:cNvPr id="51" name="Object 50"/>
+            <p:cNvPr id="8" name="Object 7"/>
             <p:cNvGraphicFramePr>
               <a:graphicFrameLocks noChangeAspect="1"/>
             </p:cNvGraphicFramePr>
@@ -14621,7 +14666,7 @@
           </p:xfrm>
           <a:graphic>
             <a:graphicData uri="http://schemas.openxmlformats.org/presentationml/2006/ole">
-              <p:oleObj spid="_x0000_s62480" name="Equation" r:id="rId9" imgW="139700" imgH="393700" progId="Equation.DSMT4">
+              <p:oleObj spid="_x0000_s78851" name="Equation" r:id="rId4" imgW="139700" imgH="393700" progId="Equation.DSMT4">
                 <p:embed/>
               </p:oleObj>
             </a:graphicData>
@@ -14629,7 +14674,7 @@
         </p:graphicFrame>
         <p:sp>
           <p:nvSpPr>
-            <p:cNvPr id="54" name="Isosceles Triangle 53"/>
+            <p:cNvPr id="9" name="Isosceles Triangle 8"/>
             <p:cNvSpPr/>
             <p:nvPr/>
           </p:nvSpPr>
@@ -14676,7 +14721,7 @@
         </p:sp>
         <p:sp>
           <p:nvSpPr>
-            <p:cNvPr id="58" name="Oval 57"/>
+            <p:cNvPr id="10" name="Oval 9"/>
             <p:cNvSpPr/>
             <p:nvPr/>
           </p:nvSpPr>
@@ -14720,10 +14765,10 @@
         </p:sp>
         <p:cxnSp>
           <p:nvCxnSpPr>
-            <p:cNvPr id="60" name="Straight Arrow Connector 59"/>
+            <p:cNvPr id="11" name="Straight Arrow Connector 10"/>
             <p:cNvCxnSpPr>
-              <a:stCxn id="42" idx="3"/>
-              <a:endCxn id="58" idx="2"/>
+              <a:stCxn id="5" idx="3"/>
+              <a:endCxn id="10" idx="2"/>
             </p:cNvCxnSpPr>
             <p:nvPr/>
           </p:nvCxnSpPr>
@@ -14760,7 +14805,7 @@
         </p:cxnSp>
         <p:cxnSp>
           <p:nvCxnSpPr>
-            <p:cNvPr id="65" name="Straight Arrow Connector 64"/>
+            <p:cNvPr id="12" name="Straight Arrow Connector 11"/>
             <p:cNvCxnSpPr/>
             <p:nvPr/>
           </p:nvCxnSpPr>
@@ -14797,9 +14842,9 @@
         </p:cxnSp>
         <p:cxnSp>
           <p:nvCxnSpPr>
-            <p:cNvPr id="66" name="Straight Arrow Connector 65"/>
+            <p:cNvPr id="13" name="Straight Arrow Connector 12"/>
             <p:cNvCxnSpPr>
-              <a:stCxn id="54" idx="0"/>
+              <a:stCxn id="9" idx="0"/>
             </p:cNvCxnSpPr>
             <p:nvPr/>
           </p:nvCxnSpPr>
@@ -14836,7 +14881,7 @@
         </p:cxnSp>
         <p:sp>
           <p:nvSpPr>
-            <p:cNvPr id="70" name="Isosceles Triangle 69"/>
+            <p:cNvPr id="14" name="Isosceles Triangle 13"/>
             <p:cNvSpPr/>
             <p:nvPr/>
           </p:nvSpPr>
@@ -14883,9 +14928,9 @@
         </p:sp>
         <p:cxnSp>
           <p:nvCxnSpPr>
-            <p:cNvPr id="71" name="Straight Arrow Connector 70"/>
+            <p:cNvPr id="15" name="Straight Arrow Connector 14"/>
             <p:cNvCxnSpPr>
-              <a:stCxn id="70" idx="0"/>
+              <a:stCxn id="14" idx="0"/>
             </p:cNvCxnSpPr>
             <p:nvPr/>
           </p:nvCxnSpPr>
@@ -14922,7 +14967,7 @@
         </p:cxnSp>
         <p:cxnSp>
           <p:nvCxnSpPr>
-            <p:cNvPr id="78" name="Straight Arrow Connector 77"/>
+            <p:cNvPr id="16" name="Straight Arrow Connector 15"/>
             <p:cNvCxnSpPr/>
             <p:nvPr/>
           </p:nvCxnSpPr>
@@ -14959,7 +15004,7 @@
         </p:cxnSp>
         <p:grpSp>
           <p:nvGrpSpPr>
-            <p:cNvPr id="87" name="Group 86"/>
+            <p:cNvPr id="17" name="Group 86"/>
             <p:cNvGrpSpPr/>
             <p:nvPr/>
           </p:nvGrpSpPr>
@@ -14973,7 +15018,7 @@
           </p:grpSpPr>
           <p:sp>
             <p:nvSpPr>
-              <p:cNvPr id="80" name="Isosceles Triangle 79"/>
+              <p:cNvPr id="44" name="Isosceles Triangle 43"/>
               <p:cNvSpPr/>
               <p:nvPr/>
             </p:nvSpPr>
@@ -15020,7 +15065,7 @@
           </p:sp>
           <p:sp>
             <p:nvSpPr>
-              <p:cNvPr id="81" name="Oval 80"/>
+              <p:cNvPr id="45" name="Oval 44"/>
               <p:cNvSpPr/>
               <p:nvPr/>
             </p:nvSpPr>
@@ -15064,9 +15109,9 @@
           </p:sp>
           <p:cxnSp>
             <p:nvCxnSpPr>
-              <p:cNvPr id="82" name="Straight Arrow Connector 81"/>
+              <p:cNvPr id="46" name="Straight Arrow Connector 45"/>
               <p:cNvCxnSpPr>
-                <a:endCxn id="81" idx="2"/>
+                <a:endCxn id="45" idx="2"/>
               </p:cNvCxnSpPr>
               <p:nvPr/>
             </p:nvCxnSpPr>
@@ -15103,7 +15148,7 @@
           </p:cxnSp>
           <p:cxnSp>
             <p:nvCxnSpPr>
-              <p:cNvPr id="83" name="Straight Arrow Connector 82"/>
+              <p:cNvPr id="47" name="Straight Arrow Connector 46"/>
               <p:cNvCxnSpPr/>
               <p:nvPr/>
             </p:nvCxnSpPr>
@@ -15140,9 +15185,9 @@
           </p:cxnSp>
           <p:cxnSp>
             <p:nvCxnSpPr>
-              <p:cNvPr id="84" name="Straight Arrow Connector 83"/>
+              <p:cNvPr id="48" name="Straight Arrow Connector 47"/>
               <p:cNvCxnSpPr>
-                <a:stCxn id="80" idx="0"/>
+                <a:stCxn id="44" idx="0"/>
               </p:cNvCxnSpPr>
               <p:nvPr/>
             </p:nvCxnSpPr>
@@ -15179,7 +15224,7 @@
           </p:cxnSp>
           <p:sp>
             <p:nvSpPr>
-              <p:cNvPr id="85" name="Isosceles Triangle 84"/>
+              <p:cNvPr id="49" name="Isosceles Triangle 48"/>
               <p:cNvSpPr/>
               <p:nvPr/>
             </p:nvSpPr>
@@ -15226,9 +15271,9 @@
           </p:sp>
           <p:cxnSp>
             <p:nvCxnSpPr>
-              <p:cNvPr id="86" name="Straight Arrow Connector 85"/>
+              <p:cNvPr id="50" name="Straight Arrow Connector 49"/>
               <p:cNvCxnSpPr>
-                <a:stCxn id="85" idx="0"/>
+                <a:stCxn id="49" idx="0"/>
               </p:cNvCxnSpPr>
               <p:nvPr/>
             </p:nvCxnSpPr>
@@ -15266,7 +15311,7 @@
         </p:grpSp>
         <p:sp>
           <p:nvSpPr>
-            <p:cNvPr id="88" name="TextBox 87"/>
+            <p:cNvPr id="18" name="TextBox 17"/>
             <p:cNvSpPr txBox="1"/>
             <p:nvPr/>
           </p:nvSpPr>
@@ -15302,7 +15347,7 @@
         </p:sp>
         <p:sp>
           <p:nvSpPr>
-            <p:cNvPr id="89" name="TextBox 88"/>
+            <p:cNvPr id="19" name="TextBox 18"/>
             <p:cNvSpPr txBox="1"/>
             <p:nvPr/>
           </p:nvSpPr>
@@ -15338,7 +15383,7 @@
         </p:sp>
         <p:sp>
           <p:nvSpPr>
-            <p:cNvPr id="90" name="TextBox 89"/>
+            <p:cNvPr id="20" name="TextBox 19"/>
             <p:cNvSpPr txBox="1"/>
             <p:nvPr/>
           </p:nvSpPr>
@@ -15374,7 +15419,7 @@
         </p:sp>
         <p:sp>
           <p:nvSpPr>
-            <p:cNvPr id="91" name="TextBox 90"/>
+            <p:cNvPr id="21" name="TextBox 20"/>
             <p:cNvSpPr txBox="1"/>
             <p:nvPr/>
           </p:nvSpPr>
@@ -15410,7 +15455,7 @@
         </p:sp>
         <p:sp>
           <p:nvSpPr>
-            <p:cNvPr id="92" name="Isosceles Triangle 91"/>
+            <p:cNvPr id="22" name="Isosceles Triangle 21"/>
             <p:cNvSpPr/>
             <p:nvPr/>
           </p:nvSpPr>
@@ -15457,7 +15502,7 @@
         </p:sp>
         <p:sp>
           <p:nvSpPr>
-            <p:cNvPr id="93" name="TextBox 92"/>
+            <p:cNvPr id="23" name="TextBox 22"/>
             <p:cNvSpPr txBox="1"/>
             <p:nvPr/>
           </p:nvSpPr>
@@ -15493,7 +15538,7 @@
         </p:sp>
         <p:cxnSp>
           <p:nvCxnSpPr>
-            <p:cNvPr id="94" name="Straight Arrow Connector 93"/>
+            <p:cNvPr id="24" name="Straight Arrow Connector 23"/>
             <p:cNvCxnSpPr/>
             <p:nvPr/>
           </p:nvCxnSpPr>
@@ -15530,7 +15575,7 @@
         </p:cxnSp>
         <p:sp>
           <p:nvSpPr>
-            <p:cNvPr id="96" name="TextBox 95"/>
+            <p:cNvPr id="25" name="TextBox 24"/>
             <p:cNvSpPr txBox="1"/>
             <p:nvPr/>
           </p:nvSpPr>
@@ -15564,7 +15609,7 @@
         </p:sp>
         <p:graphicFrame>
           <p:nvGraphicFramePr>
-            <p:cNvPr id="97" name="Object 96"/>
+            <p:cNvPr id="26" name="Object 25"/>
             <p:cNvGraphicFramePr>
               <a:graphicFrameLocks noChangeAspect="1"/>
             </p:cNvGraphicFramePr>
@@ -15576,7 +15621,7 @@
           </p:xfrm>
           <a:graphic>
             <a:graphicData uri="http://schemas.openxmlformats.org/presentationml/2006/ole">
-              <p:oleObj spid="_x0000_s62481" name="Equation" r:id="rId10" imgW="406400" imgH="203200" progId="Equation.DSMT4">
+              <p:oleObj spid="_x0000_s78852" name="Equation" r:id="rId5" imgW="406400" imgH="203200" progId="Equation.DSMT4">
                 <p:embed/>
               </p:oleObj>
             </a:graphicData>
@@ -15584,7 +15629,7 @@
         </p:graphicFrame>
         <p:graphicFrame>
           <p:nvGraphicFramePr>
-            <p:cNvPr id="98" name="Object 97"/>
+            <p:cNvPr id="27" name="Object 26"/>
             <p:cNvGraphicFramePr>
               <a:graphicFrameLocks noChangeAspect="1"/>
             </p:cNvGraphicFramePr>
@@ -15596,7 +15641,7 @@
           </p:xfrm>
           <a:graphic>
             <a:graphicData uri="http://schemas.openxmlformats.org/presentationml/2006/ole">
-              <p:oleObj spid="_x0000_s62482" name="Equation" r:id="rId11" imgW="177800" imgH="203200" progId="Equation.DSMT4">
+              <p:oleObj spid="_x0000_s78853" name="Equation" r:id="rId6" imgW="177800" imgH="203200" progId="Equation.DSMT4">
                 <p:embed/>
               </p:oleObj>
             </a:graphicData>
@@ -15604,7 +15649,7 @@
         </p:graphicFrame>
         <p:sp>
           <p:nvSpPr>
-            <p:cNvPr id="99" name="TextBox 98"/>
+            <p:cNvPr id="28" name="TextBox 27"/>
             <p:cNvSpPr txBox="1"/>
             <p:nvPr/>
           </p:nvSpPr>
@@ -15638,7 +15683,7 @@
         </p:sp>
         <p:sp>
           <p:nvSpPr>
-            <p:cNvPr id="100" name="TextBox 99"/>
+            <p:cNvPr id="29" name="TextBox 28"/>
             <p:cNvSpPr txBox="1"/>
             <p:nvPr/>
           </p:nvSpPr>
@@ -15672,7 +15717,7 @@
         </p:sp>
         <p:sp>
           <p:nvSpPr>
-            <p:cNvPr id="101" name="TextBox 100"/>
+            <p:cNvPr id="30" name="TextBox 29"/>
             <p:cNvSpPr txBox="1"/>
             <p:nvPr/>
           </p:nvSpPr>
@@ -15706,9 +15751,9 @@
         </p:sp>
         <p:cxnSp>
           <p:nvCxnSpPr>
-            <p:cNvPr id="103" name="Shape 102"/>
+            <p:cNvPr id="31" name="Shape 30"/>
             <p:cNvCxnSpPr>
-              <a:endCxn id="88" idx="1"/>
+              <a:endCxn id="18" idx="1"/>
             </p:cNvCxnSpPr>
             <p:nvPr/>
           </p:nvCxnSpPr>
@@ -15748,7 +15793,7 @@
         </p:cxnSp>
         <p:sp>
           <p:nvSpPr>
-            <p:cNvPr id="116" name="Oval 115"/>
+            <p:cNvPr id="32" name="Oval 31"/>
             <p:cNvSpPr/>
             <p:nvPr/>
           </p:nvSpPr>
@@ -15792,7 +15837,7 @@
         </p:sp>
         <p:cxnSp>
           <p:nvCxnSpPr>
-            <p:cNvPr id="118" name="Straight Arrow Connector 117"/>
+            <p:cNvPr id="33" name="Straight Arrow Connector 32"/>
             <p:cNvCxnSpPr/>
             <p:nvPr/>
           </p:nvCxnSpPr>
@@ -15829,9 +15874,9 @@
         </p:cxnSp>
         <p:cxnSp>
           <p:nvCxnSpPr>
-            <p:cNvPr id="121" name="Shape 120"/>
+            <p:cNvPr id="34" name="Shape 33"/>
             <p:cNvCxnSpPr>
-              <a:endCxn id="90" idx="1"/>
+              <a:endCxn id="20" idx="1"/>
             </p:cNvCxnSpPr>
             <p:nvPr/>
           </p:nvCxnSpPr>
@@ -15868,7 +15913,7 @@
         </p:cxnSp>
         <p:cxnSp>
           <p:nvCxnSpPr>
-            <p:cNvPr id="124" name="Straight Arrow Connector 123"/>
+            <p:cNvPr id="35" name="Straight Arrow Connector 34"/>
             <p:cNvCxnSpPr/>
             <p:nvPr/>
           </p:nvCxnSpPr>
@@ -15905,7 +15950,7 @@
         </p:cxnSp>
         <p:sp>
           <p:nvSpPr>
-            <p:cNvPr id="125" name="TextBox 124"/>
+            <p:cNvPr id="36" name="TextBox 35"/>
             <p:cNvSpPr txBox="1"/>
             <p:nvPr/>
           </p:nvSpPr>
@@ -15939,7 +15984,7 @@
         </p:sp>
         <p:sp>
           <p:nvSpPr>
-            <p:cNvPr id="126" name="TextBox 125"/>
+            <p:cNvPr id="37" name="TextBox 36"/>
             <p:cNvSpPr txBox="1"/>
             <p:nvPr/>
           </p:nvSpPr>
@@ -15973,7 +16018,7 @@
         </p:sp>
         <p:sp>
           <p:nvSpPr>
-            <p:cNvPr id="127" name="TextBox 126"/>
+            <p:cNvPr id="38" name="TextBox 37"/>
             <p:cNvSpPr txBox="1"/>
             <p:nvPr/>
           </p:nvSpPr>
@@ -16007,7 +16052,7 @@
         </p:sp>
         <p:sp>
           <p:nvSpPr>
-            <p:cNvPr id="128" name="TextBox 127"/>
+            <p:cNvPr id="39" name="TextBox 38"/>
             <p:cNvSpPr txBox="1"/>
             <p:nvPr/>
           </p:nvSpPr>
@@ -16041,7 +16086,7 @@
         </p:sp>
         <p:sp>
           <p:nvSpPr>
-            <p:cNvPr id="129" name="TextBox 128"/>
+            <p:cNvPr id="40" name="TextBox 39"/>
             <p:cNvSpPr txBox="1"/>
             <p:nvPr/>
           </p:nvSpPr>
@@ -16075,7 +16120,7 @@
         </p:sp>
         <p:cxnSp>
           <p:nvCxnSpPr>
-            <p:cNvPr id="130" name="Straight Arrow Connector 129"/>
+            <p:cNvPr id="41" name="Straight Arrow Connector 40"/>
             <p:cNvCxnSpPr/>
             <p:nvPr/>
           </p:nvCxnSpPr>
@@ -16112,7 +16157,7 @@
         </p:cxnSp>
         <p:cxnSp>
           <p:nvCxnSpPr>
-            <p:cNvPr id="131" name="Straight Arrow Connector 130"/>
+            <p:cNvPr id="42" name="Straight Arrow Connector 41"/>
             <p:cNvCxnSpPr/>
             <p:nvPr/>
           </p:nvCxnSpPr>
@@ -16149,7 +16194,7 @@
         </p:cxnSp>
         <p:sp>
           <p:nvSpPr>
-            <p:cNvPr id="134" name="TextBox 133"/>
+            <p:cNvPr id="43" name="TextBox 42"/>
             <p:cNvSpPr txBox="1"/>
             <p:nvPr/>
           </p:nvSpPr>

</xml_diff>

<commit_message>
Lecture 22: notes ready
</commit_message>
<xml_diff>
--- a/DigitalSystems/Lecture12/pictures/pictures-converted.pptx
+++ b/DigitalSystems/Lecture12/pictures/pictures-converted.pptx
@@ -214,7 +214,7 @@
             <a:fld id="{57664937-CC7E-1147-954A-F42817EF7E06}" type="datetimeFigureOut">
               <a:rPr lang="en-US" smtClean="0"/>
               <a:pPr/>
-              <a:t>2/8/10</a:t>
+              <a:t>2/11/10</a:t>
             </a:fld>
             <a:endParaRPr lang="en-US"/>
           </a:p>
@@ -744,7 +744,7 @@
             <a:fld id="{5D51CFD4-D50C-3141-B28B-5C3A3C05403C}" type="datetimeFigureOut">
               <a:rPr lang="en-US" smtClean="0"/>
               <a:pPr/>
-              <a:t>2/8/10</a:t>
+              <a:t>2/11/10</a:t>
             </a:fld>
             <a:endParaRPr lang="en-US"/>
           </a:p>
@@ -911,7 +911,7 @@
             <a:fld id="{5D51CFD4-D50C-3141-B28B-5C3A3C05403C}" type="datetimeFigureOut">
               <a:rPr lang="en-US" smtClean="0"/>
               <a:pPr/>
-              <a:t>2/8/10</a:t>
+              <a:t>2/11/10</a:t>
             </a:fld>
             <a:endParaRPr lang="en-US"/>
           </a:p>
@@ -1088,7 +1088,7 @@
             <a:fld id="{5D51CFD4-D50C-3141-B28B-5C3A3C05403C}" type="datetimeFigureOut">
               <a:rPr lang="en-US" smtClean="0"/>
               <a:pPr/>
-              <a:t>2/8/10</a:t>
+              <a:t>2/11/10</a:t>
             </a:fld>
             <a:endParaRPr lang="en-US"/>
           </a:p>
@@ -1255,7 +1255,7 @@
             <a:fld id="{5D51CFD4-D50C-3141-B28B-5C3A3C05403C}" type="datetimeFigureOut">
               <a:rPr lang="en-US" smtClean="0"/>
               <a:pPr/>
-              <a:t>2/8/10</a:t>
+              <a:t>2/11/10</a:t>
             </a:fld>
             <a:endParaRPr lang="en-US"/>
           </a:p>
@@ -1498,7 +1498,7 @@
             <a:fld id="{5D51CFD4-D50C-3141-B28B-5C3A3C05403C}" type="datetimeFigureOut">
               <a:rPr lang="en-US" smtClean="0"/>
               <a:pPr/>
-              <a:t>2/8/10</a:t>
+              <a:t>2/11/10</a:t>
             </a:fld>
             <a:endParaRPr lang="en-US"/>
           </a:p>
@@ -1783,7 +1783,7 @@
             <a:fld id="{5D51CFD4-D50C-3141-B28B-5C3A3C05403C}" type="datetimeFigureOut">
               <a:rPr lang="en-US" smtClean="0"/>
               <a:pPr/>
-              <a:t>2/8/10</a:t>
+              <a:t>2/11/10</a:t>
             </a:fld>
             <a:endParaRPr lang="en-US"/>
           </a:p>
@@ -2202,7 +2202,7 @@
             <a:fld id="{5D51CFD4-D50C-3141-B28B-5C3A3C05403C}" type="datetimeFigureOut">
               <a:rPr lang="en-US" smtClean="0"/>
               <a:pPr/>
-              <a:t>2/8/10</a:t>
+              <a:t>2/11/10</a:t>
             </a:fld>
             <a:endParaRPr lang="en-US"/>
           </a:p>
@@ -2317,7 +2317,7 @@
             <a:fld id="{5D51CFD4-D50C-3141-B28B-5C3A3C05403C}" type="datetimeFigureOut">
               <a:rPr lang="en-US" smtClean="0"/>
               <a:pPr/>
-              <a:t>2/8/10</a:t>
+              <a:t>2/11/10</a:t>
             </a:fld>
             <a:endParaRPr lang="en-US"/>
           </a:p>
@@ -2409,7 +2409,7 @@
             <a:fld id="{5D51CFD4-D50C-3141-B28B-5C3A3C05403C}" type="datetimeFigureOut">
               <a:rPr lang="en-US" smtClean="0"/>
               <a:pPr/>
-              <a:t>2/8/10</a:t>
+              <a:t>2/11/10</a:t>
             </a:fld>
             <a:endParaRPr lang="en-US"/>
           </a:p>
@@ -2683,7 +2683,7 @@
             <a:fld id="{5D51CFD4-D50C-3141-B28B-5C3A3C05403C}" type="datetimeFigureOut">
               <a:rPr lang="en-US" smtClean="0"/>
               <a:pPr/>
-              <a:t>2/8/10</a:t>
+              <a:t>2/11/10</a:t>
             </a:fld>
             <a:endParaRPr lang="en-US"/>
           </a:p>
@@ -2933,7 +2933,7 @@
             <a:fld id="{5D51CFD4-D50C-3141-B28B-5C3A3C05403C}" type="datetimeFigureOut">
               <a:rPr lang="en-US" smtClean="0"/>
               <a:pPr/>
-              <a:t>2/8/10</a:t>
+              <a:t>2/11/10</a:t>
             </a:fld>
             <a:endParaRPr lang="en-US"/>
           </a:p>
@@ -3143,7 +3143,7 @@
             <a:fld id="{5D51CFD4-D50C-3141-B28B-5C3A3C05403C}" type="datetimeFigureOut">
               <a:rPr lang="en-US" smtClean="0"/>
               <a:pPr/>
-              <a:t>2/8/10</a:t>
+              <a:t>2/11/10</a:t>
             </a:fld>
             <a:endParaRPr lang="en-US"/>
           </a:p>
@@ -3571,7 +3571,7 @@
               </a:stretch>
             </p:blipFill>
           </mc:Choice>
-          <mc:Fallback xmlns:p="http://schemas.openxmlformats.org/presentationml/2006/main" xmlns:mv="urn:schemas-microsoft-com:mac:vml" xmlns:mc="http://schemas.openxmlformats.org/markup-compatibility/2006" xmlns:r="http://schemas.openxmlformats.org/officeDocument/2006/relationships" xmlns:a="http://schemas.openxmlformats.org/drawingml/2006/main" xmlns="" xmlns:ma="http://schemas.microsoft.com/office/mac/drawingml/2008/main">
+          <mc:Fallback xmlns:ma="http://schemas.microsoft.com/office/mac/drawingml/2008/main" xmlns="" xmlns:a="http://schemas.openxmlformats.org/drawingml/2006/main" xmlns:r="http://schemas.openxmlformats.org/officeDocument/2006/relationships" xmlns:mc="http://schemas.openxmlformats.org/markup-compatibility/2006" xmlns:mv="urn:schemas-microsoft-com:mac:vml" xmlns:p="http://schemas.openxmlformats.org/presentationml/2006/main">
             <p:blipFill>
               <a:blip r:embed="rId3"/>
               <a:stretch>
@@ -3675,7 +3675,7 @@
               </a:stretch>
             </p:blipFill>
           </mc:Choice>
-          <mc:Fallback xmlns:p="http://schemas.openxmlformats.org/presentationml/2006/main" xmlns:mv="urn:schemas-microsoft-com:mac:vml" xmlns:mc="http://schemas.openxmlformats.org/markup-compatibility/2006" xmlns:r="http://schemas.openxmlformats.org/officeDocument/2006/relationships" xmlns:a="http://schemas.openxmlformats.org/drawingml/2006/main" xmlns="" xmlns:ma="http://schemas.microsoft.com/office/mac/drawingml/2008/main">
+          <mc:Fallback xmlns:ma="http://schemas.microsoft.com/office/mac/drawingml/2008/main" xmlns="" xmlns:a="http://schemas.openxmlformats.org/drawingml/2006/main" xmlns:r="http://schemas.openxmlformats.org/officeDocument/2006/relationships" xmlns:mc="http://schemas.openxmlformats.org/markup-compatibility/2006" xmlns:mv="urn:schemas-microsoft-com:mac:vml" xmlns:p="http://schemas.openxmlformats.org/presentationml/2006/main">
             <p:blipFill>
               <a:blip r:embed="rId5"/>
               <a:stretch>
@@ -3745,7 +3745,7 @@
               </a:stretch>
             </p:blipFill>
           </mc:Choice>
-          <mc:Fallback xmlns:p="http://schemas.openxmlformats.org/presentationml/2006/main" xmlns:mv="urn:schemas-microsoft-com:mac:vml" xmlns:mc="http://schemas.openxmlformats.org/markup-compatibility/2006" xmlns:r="http://schemas.openxmlformats.org/officeDocument/2006/relationships" xmlns:a="http://schemas.openxmlformats.org/drawingml/2006/main" xmlns="" xmlns:ma="http://schemas.microsoft.com/office/mac/drawingml/2008/main">
+          <mc:Fallback xmlns:ma="http://schemas.microsoft.com/office/mac/drawingml/2008/main" xmlns="" xmlns:a="http://schemas.openxmlformats.org/drawingml/2006/main" xmlns:r="http://schemas.openxmlformats.org/officeDocument/2006/relationships" xmlns:mc="http://schemas.openxmlformats.org/markup-compatibility/2006" xmlns:mv="urn:schemas-microsoft-com:mac:vml" xmlns:p="http://schemas.openxmlformats.org/presentationml/2006/main">
             <p:blipFill>
               <a:blip r:embed="rId7"/>
               <a:stretch>
@@ -3849,7 +3849,7 @@
               </a:stretch>
             </p:blipFill>
           </mc:Choice>
-          <mc:Fallback xmlns:p="http://schemas.openxmlformats.org/presentationml/2006/main" xmlns:mv="urn:schemas-microsoft-com:mac:vml" xmlns:mc="http://schemas.openxmlformats.org/markup-compatibility/2006" xmlns:r="http://schemas.openxmlformats.org/officeDocument/2006/relationships" xmlns:a="http://schemas.openxmlformats.org/drawingml/2006/main" xmlns="" xmlns:ma="http://schemas.microsoft.com/office/mac/drawingml/2008/main">
+          <mc:Fallback xmlns:ma="http://schemas.microsoft.com/office/mac/drawingml/2008/main" xmlns="" xmlns:a="http://schemas.openxmlformats.org/drawingml/2006/main" xmlns:r="http://schemas.openxmlformats.org/officeDocument/2006/relationships" xmlns:mc="http://schemas.openxmlformats.org/markup-compatibility/2006" xmlns:mv="urn:schemas-microsoft-com:mac:vml" xmlns:p="http://schemas.openxmlformats.org/presentationml/2006/main">
             <p:blipFill>
               <a:blip r:embed="rId9"/>
               <a:stretch>
@@ -3987,7 +3987,7 @@
               </a:stretch>
             </p:blipFill>
           </mc:Choice>
-          <mc:Fallback xmlns:p="http://schemas.openxmlformats.org/presentationml/2006/main" xmlns:mv="urn:schemas-microsoft-com:mac:vml" xmlns:mc="http://schemas.openxmlformats.org/markup-compatibility/2006" xmlns:r="http://schemas.openxmlformats.org/officeDocument/2006/relationships" xmlns:a="http://schemas.openxmlformats.org/drawingml/2006/main" xmlns="" xmlns:ma="http://schemas.microsoft.com/office/mac/drawingml/2008/main">
+          <mc:Fallback xmlns:ma="http://schemas.microsoft.com/office/mac/drawingml/2008/main" xmlns="" xmlns:a="http://schemas.openxmlformats.org/drawingml/2006/main" xmlns:r="http://schemas.openxmlformats.org/officeDocument/2006/relationships" xmlns:mc="http://schemas.openxmlformats.org/markup-compatibility/2006" xmlns:mv="urn:schemas-microsoft-com:mac:vml" xmlns:p="http://schemas.openxmlformats.org/presentationml/2006/main">
             <p:blipFill>
               <a:blip r:embed="rId11"/>
               <a:stretch>
@@ -4049,7 +4049,7 @@
         <p:spPr>
           <a:xfrm>
             <a:off x="4182058" y="2869783"/>
-            <a:ext cx="300082" cy="369332"/>
+            <a:ext cx="325730" cy="369332"/>
           </a:xfrm>
           <a:prstGeom prst="rect">
             <a:avLst/>
@@ -4066,7 +4066,7 @@
               <a:rPr lang="en-US" dirty="0" smtClean="0">
                 <a:latin typeface="Symbol"/>
               </a:rPr>
-              <a:t>-</a:t>
+              <a:t>+</a:t>
             </a:r>
             <a:endParaRPr lang="en-US" dirty="0">
               <a:latin typeface="Symbol"/>
@@ -4117,7 +4117,7 @@
         <p:spPr>
           <a:xfrm>
             <a:off x="5504759" y="3783394"/>
-            <a:ext cx="300082" cy="369332"/>
+            <a:ext cx="325730" cy="369332"/>
           </a:xfrm>
           <a:prstGeom prst="rect">
             <a:avLst/>
@@ -4134,7 +4134,7 @@
               <a:rPr lang="en-US" dirty="0" smtClean="0">
                 <a:latin typeface="Symbol"/>
               </a:rPr>
-              <a:t>-</a:t>
+              <a:t>+</a:t>
             </a:r>
             <a:endParaRPr lang="en-US" dirty="0">
               <a:latin typeface="Symbol"/>
@@ -4224,8 +4224,8 @@
           </p:cNvPicPr>
           <p:nvPr/>
         </p:nvPicPr>
-        <mc:AlternateContent xmlns:ma="http://schemas.microsoft.com/office/mac/drawingml/2008/main">
-          <mc:Choice Requires="ma">
+        <mc:AlternateContent>
+          <mc:Choice xmlns:ma="http://schemas.microsoft.com/office/mac/drawingml/2008/main" Requires="ma">
             <p:blipFill>
               <a:blip r:embed="rId12"/>
               <a:stretch>
@@ -4233,7 +4233,7 @@
               </a:stretch>
             </p:blipFill>
           </mc:Choice>
-          <mc:Fallback xmlns:p="http://schemas.openxmlformats.org/presentationml/2006/main" xmlns:mv="urn:schemas-microsoft-com:mac:vml" xmlns:mc="http://schemas.openxmlformats.org/markup-compatibility/2006" xmlns:r="http://schemas.openxmlformats.org/officeDocument/2006/relationships" xmlns:a="http://schemas.openxmlformats.org/drawingml/2006/main" xmlns="" xmlns:ma="http://schemas.microsoft.com/office/mac/drawingml/2008/main">
+          <mc:Fallback>
             <p:blipFill>
               <a:blip r:embed="rId13"/>
               <a:stretch>
@@ -4244,7 +4244,7 @@
         </mc:AlternateContent>
         <p:spPr>
           <a:xfrm>
-            <a:off x="1238250" y="4385012"/>
+            <a:off x="1238250" y="4678124"/>
             <a:ext cx="6667500" cy="1320800"/>
           </a:xfrm>
           <a:prstGeom prst="rect">
@@ -4260,8 +4260,8 @@
         </p:nvSpPr>
         <p:spPr>
           <a:xfrm>
-            <a:off x="4288412" y="5377715"/>
-            <a:ext cx="300082" cy="369332"/>
+            <a:off x="4288412" y="5670827"/>
+            <a:ext cx="325730" cy="369332"/>
           </a:xfrm>
           <a:prstGeom prst="rect">
             <a:avLst/>
@@ -4278,7 +4278,7 @@
               <a:rPr lang="en-US" dirty="0" smtClean="0">
                 <a:latin typeface="Symbol"/>
               </a:rPr>
-              <a:t>-</a:t>
+              <a:t>+</a:t>
             </a:r>
             <a:endParaRPr lang="en-US" dirty="0">
               <a:latin typeface="Symbol"/>

</xml_diff>